<commit_message>
modelo conceptual - relacional
</commit_message>
<xml_diff>
--- a/CSHARP/04. APLICACION SITUACION PROBLEMATICA/01. CASO ESTUDIO PROYECTOS - MODELO CONCEPTUAL.pptx
+++ b/CSHARP/04. APLICACION SITUACION PROBLEMATICA/01. CASO ESTUDIO PROYECTOS - MODELO CONCEPTUAL.pptx
@@ -14,7 +14,7 @@
     <p:sldId id="380" r:id="rId5"/>
     <p:sldId id="381" r:id="rId6"/>
     <p:sldId id="382" r:id="rId7"/>
-    <p:sldId id="360" r:id="rId8"/>
+    <p:sldId id="384" r:id="rId8"/>
     <p:sldId id="383" r:id="rId9"/>
   </p:sldIdLst>
   <p:sldSz cx="12192000" cy="6858000"/>
@@ -21288,7 +21288,7 @@
           <a:p>
             <a:fld id="{B6E6CCBB-7448-4D8B-97E4-07C3B3EA5E29}" type="datetimeFigureOut">
               <a:rPr lang="es-CO" smtClean="0"/>
-              <a:t>15/10/2022</a:t>
+              <a:t>22/10/2022</a:t>
             </a:fld>
             <a:endParaRPr lang="es-CO"/>
           </a:p>
@@ -21578,7 +21578,7 @@
           <p:cNvPr id="2" name="Título 1">
             <a:extLst>
               <a:ext uri="{FF2B5EF4-FFF2-40B4-BE49-F238E27FC236}">
-                <a16:creationId xmlns="" xmlns:a16="http://schemas.microsoft.com/office/drawing/2014/main" id="{393DCA57-3396-437C-A001-485CE0774BCB}"/>
+                <a16:creationId xmlns:a16="http://schemas.microsoft.com/office/drawing/2014/main" xmlns="" id="{393DCA57-3396-437C-A001-485CE0774BCB}"/>
               </a:ext>
             </a:extLst>
           </p:cNvPr>
@@ -21616,7 +21616,7 @@
           <p:cNvPr id="3" name="Subtítulo 2">
             <a:extLst>
               <a:ext uri="{FF2B5EF4-FFF2-40B4-BE49-F238E27FC236}">
-                <a16:creationId xmlns="" xmlns:a16="http://schemas.microsoft.com/office/drawing/2014/main" id="{E7C27F3B-2C4D-4B52-B702-B3BCC746E04D}"/>
+                <a16:creationId xmlns:a16="http://schemas.microsoft.com/office/drawing/2014/main" xmlns="" id="{E7C27F3B-2C4D-4B52-B702-B3BCC746E04D}"/>
               </a:ext>
             </a:extLst>
           </p:cNvPr>
@@ -21687,7 +21687,7 @@
           <p:cNvPr id="4" name="Marcador de fecha 3">
             <a:extLst>
               <a:ext uri="{FF2B5EF4-FFF2-40B4-BE49-F238E27FC236}">
-                <a16:creationId xmlns="" xmlns:a16="http://schemas.microsoft.com/office/drawing/2014/main" id="{2BC638D5-718C-4E49-9D1E-190F3C8E07C2}"/>
+                <a16:creationId xmlns:a16="http://schemas.microsoft.com/office/drawing/2014/main" xmlns="" id="{2BC638D5-718C-4E49-9D1E-190F3C8E07C2}"/>
               </a:ext>
             </a:extLst>
           </p:cNvPr>
@@ -21705,7 +21705,7 @@
           <a:p>
             <a:fld id="{20D1709E-3946-46D0-AB21-FE17C010AAA6}" type="datetimeFigureOut">
               <a:rPr lang="es-CO" smtClean="0"/>
-              <a:t>15/10/2022</a:t>
+              <a:t>22/10/2022</a:t>
             </a:fld>
             <a:endParaRPr lang="es-CO"/>
           </a:p>
@@ -21716,7 +21716,7 @@
           <p:cNvPr id="5" name="Marcador de pie de página 4">
             <a:extLst>
               <a:ext uri="{FF2B5EF4-FFF2-40B4-BE49-F238E27FC236}">
-                <a16:creationId xmlns="" xmlns:a16="http://schemas.microsoft.com/office/drawing/2014/main" id="{3276707C-FB46-45F5-818B-36FAEB8F340A}"/>
+                <a16:creationId xmlns:a16="http://schemas.microsoft.com/office/drawing/2014/main" xmlns="" id="{3276707C-FB46-45F5-818B-36FAEB8F340A}"/>
               </a:ext>
             </a:extLst>
           </p:cNvPr>
@@ -21741,7 +21741,7 @@
           <p:cNvPr id="6" name="Marcador de número de diapositiva 5">
             <a:extLst>
               <a:ext uri="{FF2B5EF4-FFF2-40B4-BE49-F238E27FC236}">
-                <a16:creationId xmlns="" xmlns:a16="http://schemas.microsoft.com/office/drawing/2014/main" id="{8FD16FDC-7D3B-42F9-BEDD-65133C487E69}"/>
+                <a16:creationId xmlns:a16="http://schemas.microsoft.com/office/drawing/2014/main" xmlns="" id="{8FD16FDC-7D3B-42F9-BEDD-65133C487E69}"/>
               </a:ext>
             </a:extLst>
           </p:cNvPr>
@@ -21770,7 +21770,7 @@
           <p:cNvPr id="12" name="Imagen 11">
             <a:extLst>
               <a:ext uri="{FF2B5EF4-FFF2-40B4-BE49-F238E27FC236}">
-                <a16:creationId xmlns="" xmlns:a16="http://schemas.microsoft.com/office/drawing/2014/main" id="{6ECC74C6-FB85-4281-8B0D-0712678A8553}"/>
+                <a16:creationId xmlns:a16="http://schemas.microsoft.com/office/drawing/2014/main" xmlns="" id="{6ECC74C6-FB85-4281-8B0D-0712678A8553}"/>
               </a:ext>
             </a:extLst>
           </p:cNvPr>
@@ -21836,7 +21836,7 @@
           <p:cNvPr id="2" name="Título 1">
             <a:extLst>
               <a:ext uri="{FF2B5EF4-FFF2-40B4-BE49-F238E27FC236}">
-                <a16:creationId xmlns="" xmlns:a16="http://schemas.microsoft.com/office/drawing/2014/main" id="{456072B7-7FDF-43D2-AF95-1C5D0BE8C2EB}"/>
+                <a16:creationId xmlns:a16="http://schemas.microsoft.com/office/drawing/2014/main" xmlns="" id="{456072B7-7FDF-43D2-AF95-1C5D0BE8C2EB}"/>
               </a:ext>
             </a:extLst>
           </p:cNvPr>
@@ -21865,7 +21865,7 @@
           <p:cNvPr id="3" name="Marcador de contenido 2">
             <a:extLst>
               <a:ext uri="{FF2B5EF4-FFF2-40B4-BE49-F238E27FC236}">
-                <a16:creationId xmlns="" xmlns:a16="http://schemas.microsoft.com/office/drawing/2014/main" id="{AC392882-4362-4C14-A359-0E232BB2FCB4}"/>
+                <a16:creationId xmlns:a16="http://schemas.microsoft.com/office/drawing/2014/main" xmlns="" id="{AC392882-4362-4C14-A359-0E232BB2FCB4}"/>
               </a:ext>
             </a:extLst>
           </p:cNvPr>
@@ -21923,7 +21923,7 @@
           <p:cNvPr id="4" name="Marcador de fecha 3">
             <a:extLst>
               <a:ext uri="{FF2B5EF4-FFF2-40B4-BE49-F238E27FC236}">
-                <a16:creationId xmlns="" xmlns:a16="http://schemas.microsoft.com/office/drawing/2014/main" id="{A7DAF922-BFAF-44E6-8AFB-FBEF3F4E2A8D}"/>
+                <a16:creationId xmlns:a16="http://schemas.microsoft.com/office/drawing/2014/main" xmlns="" id="{A7DAF922-BFAF-44E6-8AFB-FBEF3F4E2A8D}"/>
               </a:ext>
             </a:extLst>
           </p:cNvPr>
@@ -21941,7 +21941,7 @@
           <a:p>
             <a:fld id="{20D1709E-3946-46D0-AB21-FE17C010AAA6}" type="datetimeFigureOut">
               <a:rPr lang="es-CO" smtClean="0"/>
-              <a:t>15/10/2022</a:t>
+              <a:t>22/10/2022</a:t>
             </a:fld>
             <a:endParaRPr lang="es-CO"/>
           </a:p>
@@ -21952,7 +21952,7 @@
           <p:cNvPr id="5" name="Marcador de pie de página 4">
             <a:extLst>
               <a:ext uri="{FF2B5EF4-FFF2-40B4-BE49-F238E27FC236}">
-                <a16:creationId xmlns="" xmlns:a16="http://schemas.microsoft.com/office/drawing/2014/main" id="{10488B6D-8DCB-4622-84C4-C2692790C63D}"/>
+                <a16:creationId xmlns:a16="http://schemas.microsoft.com/office/drawing/2014/main" xmlns="" id="{10488B6D-8DCB-4622-84C4-C2692790C63D}"/>
               </a:ext>
             </a:extLst>
           </p:cNvPr>
@@ -21977,7 +21977,7 @@
           <p:cNvPr id="6" name="Marcador de número de diapositiva 5">
             <a:extLst>
               <a:ext uri="{FF2B5EF4-FFF2-40B4-BE49-F238E27FC236}">
-                <a16:creationId xmlns="" xmlns:a16="http://schemas.microsoft.com/office/drawing/2014/main" id="{3F24E3C1-CA2F-480F-B317-8880F18A5351}"/>
+                <a16:creationId xmlns:a16="http://schemas.microsoft.com/office/drawing/2014/main" xmlns="" id="{3F24E3C1-CA2F-480F-B317-8880F18A5351}"/>
               </a:ext>
             </a:extLst>
           </p:cNvPr>
@@ -22006,7 +22006,7 @@
           <p:cNvPr id="11" name="Imagen 10">
             <a:extLst>
               <a:ext uri="{FF2B5EF4-FFF2-40B4-BE49-F238E27FC236}">
-                <a16:creationId xmlns="" xmlns:a16="http://schemas.microsoft.com/office/drawing/2014/main" id="{5386D8B5-7850-4D65-9275-CE9653EB313D}"/>
+                <a16:creationId xmlns:a16="http://schemas.microsoft.com/office/drawing/2014/main" xmlns="" id="{5386D8B5-7850-4D65-9275-CE9653EB313D}"/>
               </a:ext>
             </a:extLst>
           </p:cNvPr>
@@ -22072,7 +22072,7 @@
           <p:cNvPr id="2" name="Título 1">
             <a:extLst>
               <a:ext uri="{FF2B5EF4-FFF2-40B4-BE49-F238E27FC236}">
-                <a16:creationId xmlns="" xmlns:a16="http://schemas.microsoft.com/office/drawing/2014/main" id="{87BD01F4-E638-4C40-8A29-56E1E3CB925E}"/>
+                <a16:creationId xmlns:a16="http://schemas.microsoft.com/office/drawing/2014/main" xmlns="" id="{87BD01F4-E638-4C40-8A29-56E1E3CB925E}"/>
               </a:ext>
             </a:extLst>
           </p:cNvPr>
@@ -22106,7 +22106,7 @@
           <p:cNvPr id="3" name="Marcador de texto 2">
             <a:extLst>
               <a:ext uri="{FF2B5EF4-FFF2-40B4-BE49-F238E27FC236}">
-                <a16:creationId xmlns="" xmlns:a16="http://schemas.microsoft.com/office/drawing/2014/main" id="{2843129E-9B5A-41BC-BCDD-ED6766FC1442}"/>
+                <a16:creationId xmlns:a16="http://schemas.microsoft.com/office/drawing/2014/main" xmlns="" id="{2843129E-9B5A-41BC-BCDD-ED6766FC1442}"/>
               </a:ext>
             </a:extLst>
           </p:cNvPr>
@@ -22177,7 +22177,7 @@
           <p:cNvPr id="4" name="Marcador de contenido 3">
             <a:extLst>
               <a:ext uri="{FF2B5EF4-FFF2-40B4-BE49-F238E27FC236}">
-                <a16:creationId xmlns="" xmlns:a16="http://schemas.microsoft.com/office/drawing/2014/main" id="{0F70F18A-9287-45A9-ABCF-96A2EDCA0051}"/>
+                <a16:creationId xmlns:a16="http://schemas.microsoft.com/office/drawing/2014/main" xmlns="" id="{0F70F18A-9287-45A9-ABCF-96A2EDCA0051}"/>
               </a:ext>
             </a:extLst>
           </p:cNvPr>
@@ -22240,7 +22240,7 @@
           <p:cNvPr id="5" name="Marcador de texto 4">
             <a:extLst>
               <a:ext uri="{FF2B5EF4-FFF2-40B4-BE49-F238E27FC236}">
-                <a16:creationId xmlns="" xmlns:a16="http://schemas.microsoft.com/office/drawing/2014/main" id="{5581F368-EF72-43BE-820C-169DE25488BB}"/>
+                <a16:creationId xmlns:a16="http://schemas.microsoft.com/office/drawing/2014/main" xmlns="" id="{5581F368-EF72-43BE-820C-169DE25488BB}"/>
               </a:ext>
             </a:extLst>
           </p:cNvPr>
@@ -22311,7 +22311,7 @@
           <p:cNvPr id="6" name="Marcador de contenido 5">
             <a:extLst>
               <a:ext uri="{FF2B5EF4-FFF2-40B4-BE49-F238E27FC236}">
-                <a16:creationId xmlns="" xmlns:a16="http://schemas.microsoft.com/office/drawing/2014/main" id="{AD16AF1A-3AE2-4D57-8BC6-6D616D949765}"/>
+                <a16:creationId xmlns:a16="http://schemas.microsoft.com/office/drawing/2014/main" xmlns="" id="{AD16AF1A-3AE2-4D57-8BC6-6D616D949765}"/>
               </a:ext>
             </a:extLst>
           </p:cNvPr>
@@ -22374,7 +22374,7 @@
           <p:cNvPr id="7" name="Marcador de fecha 6">
             <a:extLst>
               <a:ext uri="{FF2B5EF4-FFF2-40B4-BE49-F238E27FC236}">
-                <a16:creationId xmlns="" xmlns:a16="http://schemas.microsoft.com/office/drawing/2014/main" id="{EF89162C-18BA-4599-A8AB-FC4ECB05A9EB}"/>
+                <a16:creationId xmlns:a16="http://schemas.microsoft.com/office/drawing/2014/main" xmlns="" id="{EF89162C-18BA-4599-A8AB-FC4ECB05A9EB}"/>
               </a:ext>
             </a:extLst>
           </p:cNvPr>
@@ -22392,7 +22392,7 @@
           <a:p>
             <a:fld id="{20D1709E-3946-46D0-AB21-FE17C010AAA6}" type="datetimeFigureOut">
               <a:rPr lang="es-CO" smtClean="0"/>
-              <a:t>15/10/2022</a:t>
+              <a:t>22/10/2022</a:t>
             </a:fld>
             <a:endParaRPr lang="es-CO"/>
           </a:p>
@@ -22403,7 +22403,7 @@
           <p:cNvPr id="8" name="Marcador de pie de página 7">
             <a:extLst>
               <a:ext uri="{FF2B5EF4-FFF2-40B4-BE49-F238E27FC236}">
-                <a16:creationId xmlns="" xmlns:a16="http://schemas.microsoft.com/office/drawing/2014/main" id="{70D7B2D2-1F66-462C-AD23-8E19AB2DFBBF}"/>
+                <a16:creationId xmlns:a16="http://schemas.microsoft.com/office/drawing/2014/main" xmlns="" id="{70D7B2D2-1F66-462C-AD23-8E19AB2DFBBF}"/>
               </a:ext>
             </a:extLst>
           </p:cNvPr>
@@ -22428,7 +22428,7 @@
           <p:cNvPr id="9" name="Marcador de número de diapositiva 8">
             <a:extLst>
               <a:ext uri="{FF2B5EF4-FFF2-40B4-BE49-F238E27FC236}">
-                <a16:creationId xmlns="" xmlns:a16="http://schemas.microsoft.com/office/drawing/2014/main" id="{1EE87630-B1CC-4ED9-B600-2B166DF97A2E}"/>
+                <a16:creationId xmlns:a16="http://schemas.microsoft.com/office/drawing/2014/main" xmlns="" id="{1EE87630-B1CC-4ED9-B600-2B166DF97A2E}"/>
               </a:ext>
             </a:extLst>
           </p:cNvPr>
@@ -22457,7 +22457,7 @@
           <p:cNvPr id="12" name="Imagen 11">
             <a:extLst>
               <a:ext uri="{FF2B5EF4-FFF2-40B4-BE49-F238E27FC236}">
-                <a16:creationId xmlns="" xmlns:a16="http://schemas.microsoft.com/office/drawing/2014/main" id="{DFE53075-3556-4CE1-B0EB-9D68612443C0}"/>
+                <a16:creationId xmlns:a16="http://schemas.microsoft.com/office/drawing/2014/main" xmlns="" id="{DFE53075-3556-4CE1-B0EB-9D68612443C0}"/>
               </a:ext>
             </a:extLst>
           </p:cNvPr>
@@ -22523,7 +22523,7 @@
           <p:cNvPr id="2" name="Título 1">
             <a:extLst>
               <a:ext uri="{FF2B5EF4-FFF2-40B4-BE49-F238E27FC236}">
-                <a16:creationId xmlns="" xmlns:a16="http://schemas.microsoft.com/office/drawing/2014/main" id="{05448947-C141-41FF-AE16-195BB2A7CBFE}"/>
+                <a16:creationId xmlns:a16="http://schemas.microsoft.com/office/drawing/2014/main" xmlns="" id="{05448947-C141-41FF-AE16-195BB2A7CBFE}"/>
               </a:ext>
             </a:extLst>
           </p:cNvPr>
@@ -22552,7 +22552,7 @@
           <p:cNvPr id="3" name="Marcador de fecha 2">
             <a:extLst>
               <a:ext uri="{FF2B5EF4-FFF2-40B4-BE49-F238E27FC236}">
-                <a16:creationId xmlns="" xmlns:a16="http://schemas.microsoft.com/office/drawing/2014/main" id="{0ED10905-2E74-417D-B07D-7B1A9F8BA4DC}"/>
+                <a16:creationId xmlns:a16="http://schemas.microsoft.com/office/drawing/2014/main" xmlns="" id="{0ED10905-2E74-417D-B07D-7B1A9F8BA4DC}"/>
               </a:ext>
             </a:extLst>
           </p:cNvPr>
@@ -22570,7 +22570,7 @@
           <a:p>
             <a:fld id="{20D1709E-3946-46D0-AB21-FE17C010AAA6}" type="datetimeFigureOut">
               <a:rPr lang="es-CO" smtClean="0"/>
-              <a:t>15/10/2022</a:t>
+              <a:t>22/10/2022</a:t>
             </a:fld>
             <a:endParaRPr lang="es-CO"/>
           </a:p>
@@ -22581,7 +22581,7 @@
           <p:cNvPr id="4" name="Marcador de pie de página 3">
             <a:extLst>
               <a:ext uri="{FF2B5EF4-FFF2-40B4-BE49-F238E27FC236}">
-                <a16:creationId xmlns="" xmlns:a16="http://schemas.microsoft.com/office/drawing/2014/main" id="{CB6C416F-B3BB-4307-8987-A5AA610D406B}"/>
+                <a16:creationId xmlns:a16="http://schemas.microsoft.com/office/drawing/2014/main" xmlns="" id="{CB6C416F-B3BB-4307-8987-A5AA610D406B}"/>
               </a:ext>
             </a:extLst>
           </p:cNvPr>
@@ -22606,7 +22606,7 @@
           <p:cNvPr id="5" name="Marcador de número de diapositiva 4">
             <a:extLst>
               <a:ext uri="{FF2B5EF4-FFF2-40B4-BE49-F238E27FC236}">
-                <a16:creationId xmlns="" xmlns:a16="http://schemas.microsoft.com/office/drawing/2014/main" id="{E8C6C406-C9B3-4E42-BD8D-E43FE8E43BDA}"/>
+                <a16:creationId xmlns:a16="http://schemas.microsoft.com/office/drawing/2014/main" xmlns="" id="{E8C6C406-C9B3-4E42-BD8D-E43FE8E43BDA}"/>
               </a:ext>
             </a:extLst>
           </p:cNvPr>
@@ -22635,7 +22635,7 @@
           <p:cNvPr id="8" name="Imagen 7">
             <a:extLst>
               <a:ext uri="{FF2B5EF4-FFF2-40B4-BE49-F238E27FC236}">
-                <a16:creationId xmlns="" xmlns:a16="http://schemas.microsoft.com/office/drawing/2014/main" id="{5E3C3009-66A0-4C0E-8DD7-1CDE9C96BA2E}"/>
+                <a16:creationId xmlns:a16="http://schemas.microsoft.com/office/drawing/2014/main" xmlns="" id="{5E3C3009-66A0-4C0E-8DD7-1CDE9C96BA2E}"/>
               </a:ext>
             </a:extLst>
           </p:cNvPr>
@@ -22701,7 +22701,7 @@
           <p:cNvPr id="2" name="Título 1">
             <a:extLst>
               <a:ext uri="{FF2B5EF4-FFF2-40B4-BE49-F238E27FC236}">
-                <a16:creationId xmlns="" xmlns:a16="http://schemas.microsoft.com/office/drawing/2014/main" id="{863D4DF8-E9EF-4922-B438-331196DC1E02}"/>
+                <a16:creationId xmlns:a16="http://schemas.microsoft.com/office/drawing/2014/main" xmlns="" id="{863D4DF8-E9EF-4922-B438-331196DC1E02}"/>
               </a:ext>
             </a:extLst>
           </p:cNvPr>
@@ -22739,7 +22739,7 @@
           <p:cNvPr id="3" name="Marcador de contenido 2">
             <a:extLst>
               <a:ext uri="{FF2B5EF4-FFF2-40B4-BE49-F238E27FC236}">
-                <a16:creationId xmlns="" xmlns:a16="http://schemas.microsoft.com/office/drawing/2014/main" id="{5BF20047-CFC6-4FF5-A38F-0EBCC2F6F6D3}"/>
+                <a16:creationId xmlns:a16="http://schemas.microsoft.com/office/drawing/2014/main" xmlns="" id="{5BF20047-CFC6-4FF5-A38F-0EBCC2F6F6D3}"/>
               </a:ext>
             </a:extLst>
           </p:cNvPr>
@@ -22830,7 +22830,7 @@
           <p:cNvPr id="4" name="Marcador de texto 3">
             <a:extLst>
               <a:ext uri="{FF2B5EF4-FFF2-40B4-BE49-F238E27FC236}">
-                <a16:creationId xmlns="" xmlns:a16="http://schemas.microsoft.com/office/drawing/2014/main" id="{C2F085C8-93F1-4BE0-90CB-99FF6BCAA44E}"/>
+                <a16:creationId xmlns:a16="http://schemas.microsoft.com/office/drawing/2014/main" xmlns="" id="{C2F085C8-93F1-4BE0-90CB-99FF6BCAA44E}"/>
               </a:ext>
             </a:extLst>
           </p:cNvPr>
@@ -22901,7 +22901,7 @@
           <p:cNvPr id="5" name="Marcador de fecha 4">
             <a:extLst>
               <a:ext uri="{FF2B5EF4-FFF2-40B4-BE49-F238E27FC236}">
-                <a16:creationId xmlns="" xmlns:a16="http://schemas.microsoft.com/office/drawing/2014/main" id="{177A5E3B-651B-4CA4-B2B7-24787CADE4A2}"/>
+                <a16:creationId xmlns:a16="http://schemas.microsoft.com/office/drawing/2014/main" xmlns="" id="{177A5E3B-651B-4CA4-B2B7-24787CADE4A2}"/>
               </a:ext>
             </a:extLst>
           </p:cNvPr>
@@ -22919,7 +22919,7 @@
           <a:p>
             <a:fld id="{20D1709E-3946-46D0-AB21-FE17C010AAA6}" type="datetimeFigureOut">
               <a:rPr lang="es-CO" smtClean="0"/>
-              <a:t>15/10/2022</a:t>
+              <a:t>22/10/2022</a:t>
             </a:fld>
             <a:endParaRPr lang="es-CO"/>
           </a:p>
@@ -22930,7 +22930,7 @@
           <p:cNvPr id="6" name="Marcador de pie de página 5">
             <a:extLst>
               <a:ext uri="{FF2B5EF4-FFF2-40B4-BE49-F238E27FC236}">
-                <a16:creationId xmlns="" xmlns:a16="http://schemas.microsoft.com/office/drawing/2014/main" id="{9EDB5E4A-F2FF-4F0E-BF61-8464EBD5D35B}"/>
+                <a16:creationId xmlns:a16="http://schemas.microsoft.com/office/drawing/2014/main" xmlns="" id="{9EDB5E4A-F2FF-4F0E-BF61-8464EBD5D35B}"/>
               </a:ext>
             </a:extLst>
           </p:cNvPr>
@@ -22955,7 +22955,7 @@
           <p:cNvPr id="7" name="Marcador de número de diapositiva 6">
             <a:extLst>
               <a:ext uri="{FF2B5EF4-FFF2-40B4-BE49-F238E27FC236}">
-                <a16:creationId xmlns="" xmlns:a16="http://schemas.microsoft.com/office/drawing/2014/main" id="{8BDDFA75-3CCE-4C71-822A-27DAF0E16D56}"/>
+                <a16:creationId xmlns:a16="http://schemas.microsoft.com/office/drawing/2014/main" xmlns="" id="{8BDDFA75-3CCE-4C71-822A-27DAF0E16D56}"/>
               </a:ext>
             </a:extLst>
           </p:cNvPr>
@@ -22984,7 +22984,7 @@
           <p:cNvPr id="11" name="Imagen 10">
             <a:extLst>
               <a:ext uri="{FF2B5EF4-FFF2-40B4-BE49-F238E27FC236}">
-                <a16:creationId xmlns="" xmlns:a16="http://schemas.microsoft.com/office/drawing/2014/main" id="{9B93726F-C1AD-4C18-B397-177B4D15514A}"/>
+                <a16:creationId xmlns:a16="http://schemas.microsoft.com/office/drawing/2014/main" xmlns="" id="{9B93726F-C1AD-4C18-B397-177B4D15514A}"/>
               </a:ext>
             </a:extLst>
           </p:cNvPr>
@@ -23050,7 +23050,7 @@
           <p:cNvPr id="2" name="Título 1">
             <a:extLst>
               <a:ext uri="{FF2B5EF4-FFF2-40B4-BE49-F238E27FC236}">
-                <a16:creationId xmlns="" xmlns:a16="http://schemas.microsoft.com/office/drawing/2014/main" id="{1398CF09-B240-4EC0-A3FA-6FB270B31D45}"/>
+                <a16:creationId xmlns:a16="http://schemas.microsoft.com/office/drawing/2014/main" xmlns="" id="{1398CF09-B240-4EC0-A3FA-6FB270B31D45}"/>
               </a:ext>
             </a:extLst>
           </p:cNvPr>
@@ -23088,7 +23088,7 @@
           <p:cNvPr id="3" name="Marcador de posición de imagen 2">
             <a:extLst>
               <a:ext uri="{FF2B5EF4-FFF2-40B4-BE49-F238E27FC236}">
-                <a16:creationId xmlns="" xmlns:a16="http://schemas.microsoft.com/office/drawing/2014/main" id="{E97EC6F1-A744-41A5-857F-DC45F453EA0B}"/>
+                <a16:creationId xmlns:a16="http://schemas.microsoft.com/office/drawing/2014/main" xmlns="" id="{E97EC6F1-A744-41A5-857F-DC45F453EA0B}"/>
               </a:ext>
             </a:extLst>
           </p:cNvPr>
@@ -23155,7 +23155,7 @@
           <p:cNvPr id="4" name="Marcador de texto 3">
             <a:extLst>
               <a:ext uri="{FF2B5EF4-FFF2-40B4-BE49-F238E27FC236}">
-                <a16:creationId xmlns="" xmlns:a16="http://schemas.microsoft.com/office/drawing/2014/main" id="{84055C9C-807D-4F2B-B335-19FD2C025637}"/>
+                <a16:creationId xmlns:a16="http://schemas.microsoft.com/office/drawing/2014/main" xmlns="" id="{84055C9C-807D-4F2B-B335-19FD2C025637}"/>
               </a:ext>
             </a:extLst>
           </p:cNvPr>
@@ -23226,7 +23226,7 @@
           <p:cNvPr id="5" name="Marcador de fecha 4">
             <a:extLst>
               <a:ext uri="{FF2B5EF4-FFF2-40B4-BE49-F238E27FC236}">
-                <a16:creationId xmlns="" xmlns:a16="http://schemas.microsoft.com/office/drawing/2014/main" id="{304120D9-3139-4247-8249-76C6B65EE3D5}"/>
+                <a16:creationId xmlns:a16="http://schemas.microsoft.com/office/drawing/2014/main" xmlns="" id="{304120D9-3139-4247-8249-76C6B65EE3D5}"/>
               </a:ext>
             </a:extLst>
           </p:cNvPr>
@@ -23244,7 +23244,7 @@
           <a:p>
             <a:fld id="{20D1709E-3946-46D0-AB21-FE17C010AAA6}" type="datetimeFigureOut">
               <a:rPr lang="es-CO" smtClean="0"/>
-              <a:t>15/10/2022</a:t>
+              <a:t>22/10/2022</a:t>
             </a:fld>
             <a:endParaRPr lang="es-CO"/>
           </a:p>
@@ -23255,7 +23255,7 @@
           <p:cNvPr id="6" name="Marcador de pie de página 5">
             <a:extLst>
               <a:ext uri="{FF2B5EF4-FFF2-40B4-BE49-F238E27FC236}">
-                <a16:creationId xmlns="" xmlns:a16="http://schemas.microsoft.com/office/drawing/2014/main" id="{575D8828-E5CD-4AFE-BACF-01C67A985695}"/>
+                <a16:creationId xmlns:a16="http://schemas.microsoft.com/office/drawing/2014/main" xmlns="" id="{575D8828-E5CD-4AFE-BACF-01C67A985695}"/>
               </a:ext>
             </a:extLst>
           </p:cNvPr>
@@ -23280,7 +23280,7 @@
           <p:cNvPr id="7" name="Marcador de número de diapositiva 6">
             <a:extLst>
               <a:ext uri="{FF2B5EF4-FFF2-40B4-BE49-F238E27FC236}">
-                <a16:creationId xmlns="" xmlns:a16="http://schemas.microsoft.com/office/drawing/2014/main" id="{48BBD036-3290-4630-8438-99FA0E26C84F}"/>
+                <a16:creationId xmlns:a16="http://schemas.microsoft.com/office/drawing/2014/main" xmlns="" id="{48BBD036-3290-4630-8438-99FA0E26C84F}"/>
               </a:ext>
             </a:extLst>
           </p:cNvPr>
@@ -23339,7 +23339,7 @@
           <p:cNvPr id="2" name="Título 1">
             <a:extLst>
               <a:ext uri="{FF2B5EF4-FFF2-40B4-BE49-F238E27FC236}">
-                <a16:creationId xmlns="" xmlns:a16="http://schemas.microsoft.com/office/drawing/2014/main" id="{8609E4E6-8C80-4BBE-90B5-E8B5EEE77870}"/>
+                <a16:creationId xmlns:a16="http://schemas.microsoft.com/office/drawing/2014/main" xmlns="" id="{8609E4E6-8C80-4BBE-90B5-E8B5EEE77870}"/>
               </a:ext>
             </a:extLst>
           </p:cNvPr>
@@ -23368,7 +23368,7 @@
           <p:cNvPr id="3" name="Marcador de texto vertical 2">
             <a:extLst>
               <a:ext uri="{FF2B5EF4-FFF2-40B4-BE49-F238E27FC236}">
-                <a16:creationId xmlns="" xmlns:a16="http://schemas.microsoft.com/office/drawing/2014/main" id="{F3D945BE-87B4-4408-8223-C10225FCD11D}"/>
+                <a16:creationId xmlns:a16="http://schemas.microsoft.com/office/drawing/2014/main" xmlns="" id="{F3D945BE-87B4-4408-8223-C10225FCD11D}"/>
               </a:ext>
             </a:extLst>
           </p:cNvPr>
@@ -23426,7 +23426,7 @@
           <p:cNvPr id="4" name="Marcador de fecha 3">
             <a:extLst>
               <a:ext uri="{FF2B5EF4-FFF2-40B4-BE49-F238E27FC236}">
-                <a16:creationId xmlns="" xmlns:a16="http://schemas.microsoft.com/office/drawing/2014/main" id="{CDC3E86A-F4EC-451F-BB90-76AC435D6089}"/>
+                <a16:creationId xmlns:a16="http://schemas.microsoft.com/office/drawing/2014/main" xmlns="" id="{CDC3E86A-F4EC-451F-BB90-76AC435D6089}"/>
               </a:ext>
             </a:extLst>
           </p:cNvPr>
@@ -23444,7 +23444,7 @@
           <a:p>
             <a:fld id="{20D1709E-3946-46D0-AB21-FE17C010AAA6}" type="datetimeFigureOut">
               <a:rPr lang="es-CO" smtClean="0"/>
-              <a:t>15/10/2022</a:t>
+              <a:t>22/10/2022</a:t>
             </a:fld>
             <a:endParaRPr lang="es-CO"/>
           </a:p>
@@ -23455,7 +23455,7 @@
           <p:cNvPr id="5" name="Marcador de pie de página 4">
             <a:extLst>
               <a:ext uri="{FF2B5EF4-FFF2-40B4-BE49-F238E27FC236}">
-                <a16:creationId xmlns="" xmlns:a16="http://schemas.microsoft.com/office/drawing/2014/main" id="{94786CB3-BE03-4373-991A-6677CBEBFF7F}"/>
+                <a16:creationId xmlns:a16="http://schemas.microsoft.com/office/drawing/2014/main" xmlns="" id="{94786CB3-BE03-4373-991A-6677CBEBFF7F}"/>
               </a:ext>
             </a:extLst>
           </p:cNvPr>
@@ -23480,7 +23480,7 @@
           <p:cNvPr id="6" name="Marcador de número de diapositiva 5">
             <a:extLst>
               <a:ext uri="{FF2B5EF4-FFF2-40B4-BE49-F238E27FC236}">
-                <a16:creationId xmlns="" xmlns:a16="http://schemas.microsoft.com/office/drawing/2014/main" id="{D057D65D-096A-4900-B1C4-2505C2DBBCC6}"/>
+                <a16:creationId xmlns:a16="http://schemas.microsoft.com/office/drawing/2014/main" xmlns="" id="{D057D65D-096A-4900-B1C4-2505C2DBBCC6}"/>
               </a:ext>
             </a:extLst>
           </p:cNvPr>
@@ -23539,7 +23539,7 @@
           <p:cNvPr id="2" name="Título vertical 1">
             <a:extLst>
               <a:ext uri="{FF2B5EF4-FFF2-40B4-BE49-F238E27FC236}">
-                <a16:creationId xmlns="" xmlns:a16="http://schemas.microsoft.com/office/drawing/2014/main" id="{49CF5996-F102-4C35-88AC-0BCE5E7C99B9}"/>
+                <a16:creationId xmlns:a16="http://schemas.microsoft.com/office/drawing/2014/main" xmlns="" id="{49CF5996-F102-4C35-88AC-0BCE5E7C99B9}"/>
               </a:ext>
             </a:extLst>
           </p:cNvPr>
@@ -23573,7 +23573,7 @@
           <p:cNvPr id="3" name="Marcador de texto vertical 2">
             <a:extLst>
               <a:ext uri="{FF2B5EF4-FFF2-40B4-BE49-F238E27FC236}">
-                <a16:creationId xmlns="" xmlns:a16="http://schemas.microsoft.com/office/drawing/2014/main" id="{14A6057D-4BD4-4035-BA06-873DD4ACEE6B}"/>
+                <a16:creationId xmlns:a16="http://schemas.microsoft.com/office/drawing/2014/main" xmlns="" id="{14A6057D-4BD4-4035-BA06-873DD4ACEE6B}"/>
               </a:ext>
             </a:extLst>
           </p:cNvPr>
@@ -23636,7 +23636,7 @@
           <p:cNvPr id="4" name="Marcador de fecha 3">
             <a:extLst>
               <a:ext uri="{FF2B5EF4-FFF2-40B4-BE49-F238E27FC236}">
-                <a16:creationId xmlns="" xmlns:a16="http://schemas.microsoft.com/office/drawing/2014/main" id="{A7DC9021-E32F-4B8E-BB06-5A91B194A9C7}"/>
+                <a16:creationId xmlns:a16="http://schemas.microsoft.com/office/drawing/2014/main" xmlns="" id="{A7DC9021-E32F-4B8E-BB06-5A91B194A9C7}"/>
               </a:ext>
             </a:extLst>
           </p:cNvPr>
@@ -23654,7 +23654,7 @@
           <a:p>
             <a:fld id="{20D1709E-3946-46D0-AB21-FE17C010AAA6}" type="datetimeFigureOut">
               <a:rPr lang="es-CO" smtClean="0"/>
-              <a:t>15/10/2022</a:t>
+              <a:t>22/10/2022</a:t>
             </a:fld>
             <a:endParaRPr lang="es-CO"/>
           </a:p>
@@ -23665,7 +23665,7 @@
           <p:cNvPr id="5" name="Marcador de pie de página 4">
             <a:extLst>
               <a:ext uri="{FF2B5EF4-FFF2-40B4-BE49-F238E27FC236}">
-                <a16:creationId xmlns="" xmlns:a16="http://schemas.microsoft.com/office/drawing/2014/main" id="{307F9F3F-1E42-4E06-AC36-8C41E60C5E4C}"/>
+                <a16:creationId xmlns:a16="http://schemas.microsoft.com/office/drawing/2014/main" xmlns="" id="{307F9F3F-1E42-4E06-AC36-8C41E60C5E4C}"/>
               </a:ext>
             </a:extLst>
           </p:cNvPr>
@@ -23690,7 +23690,7 @@
           <p:cNvPr id="6" name="Marcador de número de diapositiva 5">
             <a:extLst>
               <a:ext uri="{FF2B5EF4-FFF2-40B4-BE49-F238E27FC236}">
-                <a16:creationId xmlns="" xmlns:a16="http://schemas.microsoft.com/office/drawing/2014/main" id="{1C483B2D-7AE1-4B39-9D56-05D8599E0622}"/>
+                <a16:creationId xmlns:a16="http://schemas.microsoft.com/office/drawing/2014/main" xmlns="" id="{1C483B2D-7AE1-4B39-9D56-05D8599E0622}"/>
               </a:ext>
             </a:extLst>
           </p:cNvPr>
@@ -23754,7 +23754,7 @@
           <p:cNvPr id="2" name="Marcador de título 1">
             <a:extLst>
               <a:ext uri="{FF2B5EF4-FFF2-40B4-BE49-F238E27FC236}">
-                <a16:creationId xmlns="" xmlns:a16="http://schemas.microsoft.com/office/drawing/2014/main" id="{9D2B8E4D-B0A5-4F6D-B70B-9F893340C85A}"/>
+                <a16:creationId xmlns:a16="http://schemas.microsoft.com/office/drawing/2014/main" xmlns="" id="{9D2B8E4D-B0A5-4F6D-B70B-9F893340C85A}"/>
               </a:ext>
             </a:extLst>
           </p:cNvPr>
@@ -23793,7 +23793,7 @@
           <p:cNvPr id="3" name="Marcador de texto 2">
             <a:extLst>
               <a:ext uri="{FF2B5EF4-FFF2-40B4-BE49-F238E27FC236}">
-                <a16:creationId xmlns="" xmlns:a16="http://schemas.microsoft.com/office/drawing/2014/main" id="{92357C1C-D705-428A-8937-D01499D7293D}"/>
+                <a16:creationId xmlns:a16="http://schemas.microsoft.com/office/drawing/2014/main" xmlns="" id="{92357C1C-D705-428A-8937-D01499D7293D}"/>
               </a:ext>
             </a:extLst>
           </p:cNvPr>
@@ -23861,7 +23861,7 @@
           <p:cNvPr id="4" name="Marcador de fecha 3">
             <a:extLst>
               <a:ext uri="{FF2B5EF4-FFF2-40B4-BE49-F238E27FC236}">
-                <a16:creationId xmlns="" xmlns:a16="http://schemas.microsoft.com/office/drawing/2014/main" id="{BB18BA03-5208-414F-8E95-0899202B3CBF}"/>
+                <a16:creationId xmlns:a16="http://schemas.microsoft.com/office/drawing/2014/main" xmlns="" id="{BB18BA03-5208-414F-8E95-0899202B3CBF}"/>
               </a:ext>
             </a:extLst>
           </p:cNvPr>
@@ -23897,7 +23897,7 @@
           <a:p>
             <a:fld id="{20D1709E-3946-46D0-AB21-FE17C010AAA6}" type="datetimeFigureOut">
               <a:rPr lang="es-CO" smtClean="0"/>
-              <a:t>15/10/2022</a:t>
+              <a:t>22/10/2022</a:t>
             </a:fld>
             <a:endParaRPr lang="es-CO"/>
           </a:p>
@@ -23908,7 +23908,7 @@
           <p:cNvPr id="5" name="Marcador de pie de página 4">
             <a:extLst>
               <a:ext uri="{FF2B5EF4-FFF2-40B4-BE49-F238E27FC236}">
-                <a16:creationId xmlns="" xmlns:a16="http://schemas.microsoft.com/office/drawing/2014/main" id="{1B7E278C-CD3B-4BC7-819E-778C1B9ABDB8}"/>
+                <a16:creationId xmlns:a16="http://schemas.microsoft.com/office/drawing/2014/main" xmlns="" id="{1B7E278C-CD3B-4BC7-819E-778C1B9ABDB8}"/>
               </a:ext>
             </a:extLst>
           </p:cNvPr>
@@ -23951,7 +23951,7 @@
           <p:cNvPr id="6" name="Marcador de número de diapositiva 5">
             <a:extLst>
               <a:ext uri="{FF2B5EF4-FFF2-40B4-BE49-F238E27FC236}">
-                <a16:creationId xmlns="" xmlns:a16="http://schemas.microsoft.com/office/drawing/2014/main" id="{9B600AEB-434C-4C8A-A432-D9D84203E290}"/>
+                <a16:creationId xmlns:a16="http://schemas.microsoft.com/office/drawing/2014/main" xmlns="" id="{9B600AEB-434C-4C8A-A432-D9D84203E290}"/>
               </a:ext>
             </a:extLst>
           </p:cNvPr>
@@ -24316,7 +24316,7 @@
           <p:cNvPr id="4" name="Título 1">
             <a:extLst>
               <a:ext uri="{FF2B5EF4-FFF2-40B4-BE49-F238E27FC236}">
-                <a16:creationId xmlns="" xmlns:a16="http://schemas.microsoft.com/office/drawing/2014/main" id="{1334CBD3-A99C-41E8-9883-E9DA6A3829FF}"/>
+                <a16:creationId xmlns:a16="http://schemas.microsoft.com/office/drawing/2014/main" xmlns="" id="{1334CBD3-A99C-41E8-9883-E9DA6A3829FF}"/>
               </a:ext>
             </a:extLst>
           </p:cNvPr>
@@ -24392,7 +24392,7 @@
           <p:cNvPr id="5" name="Rectángulo 4">
             <a:extLst>
               <a:ext uri="{FF2B5EF4-FFF2-40B4-BE49-F238E27FC236}">
-                <a16:creationId xmlns="" xmlns:a16="http://schemas.microsoft.com/office/drawing/2014/main" id="{0CAE8DAB-AA51-4AAF-B433-545B03406555}"/>
+                <a16:creationId xmlns:a16="http://schemas.microsoft.com/office/drawing/2014/main" xmlns="" id="{0CAE8DAB-AA51-4AAF-B433-545B03406555}"/>
               </a:ext>
             </a:extLst>
           </p:cNvPr>
@@ -24447,7 +24447,7 @@
           <p:cNvPr id="6" name="CuadroTexto 5">
             <a:extLst>
               <a:ext uri="{FF2B5EF4-FFF2-40B4-BE49-F238E27FC236}">
-                <a16:creationId xmlns="" xmlns:a16="http://schemas.microsoft.com/office/drawing/2014/main" id="{20F98B3C-495B-4D19-8AEA-15E1C2591533}"/>
+                <a16:creationId xmlns:a16="http://schemas.microsoft.com/office/drawing/2014/main" xmlns="" id="{20F98B3C-495B-4D19-8AEA-15E1C2591533}"/>
               </a:ext>
             </a:extLst>
           </p:cNvPr>
@@ -24493,7 +24493,7 @@
           <p:cNvPr id="7" name="2 Marcador de texto">
             <a:extLst>
               <a:ext uri="{FF2B5EF4-FFF2-40B4-BE49-F238E27FC236}">
-                <a16:creationId xmlns="" xmlns:a16="http://schemas.microsoft.com/office/drawing/2014/main" id="{4185A630-10D0-4A68-B775-CDEA3FC338CC}"/>
+                <a16:creationId xmlns:a16="http://schemas.microsoft.com/office/drawing/2014/main" xmlns="" id="{4185A630-10D0-4A68-B775-CDEA3FC338CC}"/>
               </a:ext>
             </a:extLst>
           </p:cNvPr>
@@ -24716,7 +24716,7 @@
                 <a:hlinkClick r:id="rId3">
                   <a:extLst>
                     <a:ext uri="{A12FA001-AC4F-418D-AE19-62706E023703}">
-                      <ahyp:hlinkClr xmlns="" xmlns:ahyp="http://schemas.microsoft.com/office/drawing/2018/hyperlinkcolor" val="tx"/>
+                      <ahyp:hlinkClr xmlns:ahyp="http://schemas.microsoft.com/office/drawing/2018/hyperlinkcolor" xmlns="" val="tx"/>
                     </a:ext>
                   </a:extLst>
                 </a:hlinkClick>
@@ -24740,7 +24740,7 @@
           <p:cNvPr id="8" name="Group 3162">
             <a:extLst>
               <a:ext uri="{FF2B5EF4-FFF2-40B4-BE49-F238E27FC236}">
-                <a16:creationId xmlns="" xmlns:a16="http://schemas.microsoft.com/office/drawing/2014/main" id="{F6E59D80-076C-4696-A8CA-B30D77AEDCFC}"/>
+                <a16:creationId xmlns:a16="http://schemas.microsoft.com/office/drawing/2014/main" xmlns="" id="{F6E59D80-076C-4696-A8CA-B30D77AEDCFC}"/>
               </a:ext>
             </a:extLst>
           </p:cNvPr>
@@ -24760,7 +24760,7 @@
             <p:cNvPr id="9" name="Freeform 99">
               <a:extLst>
                 <a:ext uri="{FF2B5EF4-FFF2-40B4-BE49-F238E27FC236}">
-                  <a16:creationId xmlns="" xmlns:a16="http://schemas.microsoft.com/office/drawing/2014/main" id="{AC9D8E6B-9386-4529-8B1A-5F6C4064D693}"/>
+                  <a16:creationId xmlns:a16="http://schemas.microsoft.com/office/drawing/2014/main" xmlns="" id="{AC9D8E6B-9386-4529-8B1A-5F6C4064D693}"/>
                 </a:ext>
               </a:extLst>
             </p:cNvPr>
@@ -24912,7 +24912,7 @@
             <p:cNvPr id="10" name="Freeform 100">
               <a:extLst>
                 <a:ext uri="{FF2B5EF4-FFF2-40B4-BE49-F238E27FC236}">
-                  <a16:creationId xmlns="" xmlns:a16="http://schemas.microsoft.com/office/drawing/2014/main" id="{1BE1621F-DEA9-4744-AF45-C3B17B22D0A5}"/>
+                  <a16:creationId xmlns:a16="http://schemas.microsoft.com/office/drawing/2014/main" xmlns="" id="{1BE1621F-DEA9-4744-AF45-C3B17B22D0A5}"/>
                 </a:ext>
               </a:extLst>
             </p:cNvPr>
@@ -25094,7 +25094,7 @@
             <p:cNvPr id="11" name="Freeform 101">
               <a:extLst>
                 <a:ext uri="{FF2B5EF4-FFF2-40B4-BE49-F238E27FC236}">
-                  <a16:creationId xmlns="" xmlns:a16="http://schemas.microsoft.com/office/drawing/2014/main" id="{B5F1F7B1-8E8D-4FDB-86DB-4B0D68CBD359}"/>
+                  <a16:creationId xmlns:a16="http://schemas.microsoft.com/office/drawing/2014/main" xmlns="" id="{B5F1F7B1-8E8D-4FDB-86DB-4B0D68CBD359}"/>
                 </a:ext>
               </a:extLst>
             </p:cNvPr>
@@ -25286,7 +25286,7 @@
             <p:cNvPr id="12" name="Freeform 102">
               <a:extLst>
                 <a:ext uri="{FF2B5EF4-FFF2-40B4-BE49-F238E27FC236}">
-                  <a16:creationId xmlns="" xmlns:a16="http://schemas.microsoft.com/office/drawing/2014/main" id="{6E88E6C0-7894-41EE-B6E1-E22230BADB87}"/>
+                  <a16:creationId xmlns:a16="http://schemas.microsoft.com/office/drawing/2014/main" xmlns="" id="{6E88E6C0-7894-41EE-B6E1-E22230BADB87}"/>
                 </a:ext>
               </a:extLst>
             </p:cNvPr>
@@ -25468,7 +25468,7 @@
             <p:cNvPr id="13" name="Freeform 103">
               <a:extLst>
                 <a:ext uri="{FF2B5EF4-FFF2-40B4-BE49-F238E27FC236}">
-                  <a16:creationId xmlns="" xmlns:a16="http://schemas.microsoft.com/office/drawing/2014/main" id="{120BF1D0-D66A-4B60-B667-A9CA53321444}"/>
+                  <a16:creationId xmlns:a16="http://schemas.microsoft.com/office/drawing/2014/main" xmlns="" id="{120BF1D0-D66A-4B60-B667-A9CA53321444}"/>
                 </a:ext>
               </a:extLst>
             </p:cNvPr>
@@ -25650,7 +25650,7 @@
             <p:cNvPr id="14" name="Freeform 104">
               <a:extLst>
                 <a:ext uri="{FF2B5EF4-FFF2-40B4-BE49-F238E27FC236}">
-                  <a16:creationId xmlns="" xmlns:a16="http://schemas.microsoft.com/office/drawing/2014/main" id="{CAD4AEF5-B2E4-4DAC-BA85-BD6524903309}"/>
+                  <a16:creationId xmlns:a16="http://schemas.microsoft.com/office/drawing/2014/main" xmlns="" id="{CAD4AEF5-B2E4-4DAC-BA85-BD6524903309}"/>
                 </a:ext>
               </a:extLst>
             </p:cNvPr>
@@ -25872,7 +25872,7 @@
             <p:cNvPr id="15" name="Freeform 105">
               <a:extLst>
                 <a:ext uri="{FF2B5EF4-FFF2-40B4-BE49-F238E27FC236}">
-                  <a16:creationId xmlns="" xmlns:a16="http://schemas.microsoft.com/office/drawing/2014/main" id="{2C5F3221-5660-4FDD-A416-984B16B5ADAE}"/>
+                  <a16:creationId xmlns:a16="http://schemas.microsoft.com/office/drawing/2014/main" xmlns="" id="{2C5F3221-5660-4FDD-A416-984B16B5ADAE}"/>
                 </a:ext>
               </a:extLst>
             </p:cNvPr>
@@ -26114,7 +26114,7 @@
             <p:cNvPr id="16" name="Freeform 106">
               <a:extLst>
                 <a:ext uri="{FF2B5EF4-FFF2-40B4-BE49-F238E27FC236}">
-                  <a16:creationId xmlns="" xmlns:a16="http://schemas.microsoft.com/office/drawing/2014/main" id="{3619E9EE-CA2A-4A7E-9595-15737C18E0BF}"/>
+                  <a16:creationId xmlns:a16="http://schemas.microsoft.com/office/drawing/2014/main" xmlns="" id="{3619E9EE-CA2A-4A7E-9595-15737C18E0BF}"/>
                 </a:ext>
               </a:extLst>
             </p:cNvPr>
@@ -26216,7 +26216,7 @@
             <p:cNvPr id="17" name="Freeform 107">
               <a:extLst>
                 <a:ext uri="{FF2B5EF4-FFF2-40B4-BE49-F238E27FC236}">
-                  <a16:creationId xmlns="" xmlns:a16="http://schemas.microsoft.com/office/drawing/2014/main" id="{2D49FD2E-3838-4146-A460-681CDCDDDF9A}"/>
+                  <a16:creationId xmlns:a16="http://schemas.microsoft.com/office/drawing/2014/main" xmlns="" id="{2D49FD2E-3838-4146-A460-681CDCDDDF9A}"/>
                 </a:ext>
               </a:extLst>
             </p:cNvPr>
@@ -26318,7 +26318,7 @@
             <p:cNvPr id="18" name="Freeform 108">
               <a:extLst>
                 <a:ext uri="{FF2B5EF4-FFF2-40B4-BE49-F238E27FC236}">
-                  <a16:creationId xmlns="" xmlns:a16="http://schemas.microsoft.com/office/drawing/2014/main" id="{BC1FDE14-1AFF-4866-A13A-D78663B3ACF4}"/>
+                  <a16:creationId xmlns:a16="http://schemas.microsoft.com/office/drawing/2014/main" xmlns="" id="{BC1FDE14-1AFF-4866-A13A-D78663B3ACF4}"/>
                 </a:ext>
               </a:extLst>
             </p:cNvPr>
@@ -26420,7 +26420,7 @@
             <p:cNvPr id="19" name="Freeform 109">
               <a:extLst>
                 <a:ext uri="{FF2B5EF4-FFF2-40B4-BE49-F238E27FC236}">
-                  <a16:creationId xmlns="" xmlns:a16="http://schemas.microsoft.com/office/drawing/2014/main" id="{063D068F-339C-47BA-9092-606776DB4837}"/>
+                  <a16:creationId xmlns:a16="http://schemas.microsoft.com/office/drawing/2014/main" xmlns="" id="{063D068F-339C-47BA-9092-606776DB4837}"/>
                 </a:ext>
               </a:extLst>
             </p:cNvPr>
@@ -26572,7 +26572,7 @@
             <p:cNvPr id="20" name="Freeform 110">
               <a:extLst>
                 <a:ext uri="{FF2B5EF4-FFF2-40B4-BE49-F238E27FC236}">
-                  <a16:creationId xmlns="" xmlns:a16="http://schemas.microsoft.com/office/drawing/2014/main" id="{9EF6ADF9-E415-44BA-8A09-ACF76BF6F157}"/>
+                  <a16:creationId xmlns:a16="http://schemas.microsoft.com/office/drawing/2014/main" xmlns="" id="{9EF6ADF9-E415-44BA-8A09-ACF76BF6F157}"/>
                 </a:ext>
               </a:extLst>
             </p:cNvPr>
@@ -26944,7 +26944,7 @@
             <p:cNvPr id="21" name="Freeform 111">
               <a:extLst>
                 <a:ext uri="{FF2B5EF4-FFF2-40B4-BE49-F238E27FC236}">
-                  <a16:creationId xmlns="" xmlns:a16="http://schemas.microsoft.com/office/drawing/2014/main" id="{4AA15E7F-EACA-4AFC-A266-9457685D2FD1}"/>
+                  <a16:creationId xmlns:a16="http://schemas.microsoft.com/office/drawing/2014/main" xmlns="" id="{4AA15E7F-EACA-4AFC-A266-9457685D2FD1}"/>
                 </a:ext>
               </a:extLst>
             </p:cNvPr>
@@ -27116,7 +27116,7 @@
             <p:cNvPr id="22" name="Freeform 112">
               <a:extLst>
                 <a:ext uri="{FF2B5EF4-FFF2-40B4-BE49-F238E27FC236}">
-                  <a16:creationId xmlns="" xmlns:a16="http://schemas.microsoft.com/office/drawing/2014/main" id="{9ABAD878-1B58-4815-BC91-D56C1C154D07}"/>
+                  <a16:creationId xmlns:a16="http://schemas.microsoft.com/office/drawing/2014/main" xmlns="" id="{9ABAD878-1B58-4815-BC91-D56C1C154D07}"/>
                 </a:ext>
               </a:extLst>
             </p:cNvPr>
@@ -27558,7 +27558,7 @@
             <p:cNvPr id="23" name="Freeform 113">
               <a:extLst>
                 <a:ext uri="{FF2B5EF4-FFF2-40B4-BE49-F238E27FC236}">
-                  <a16:creationId xmlns="" xmlns:a16="http://schemas.microsoft.com/office/drawing/2014/main" id="{C8DD0AFC-3A0F-4444-B0BC-D95D547454BB}"/>
+                  <a16:creationId xmlns:a16="http://schemas.microsoft.com/office/drawing/2014/main" xmlns="" id="{C8DD0AFC-3A0F-4444-B0BC-D95D547454BB}"/>
                 </a:ext>
               </a:extLst>
             </p:cNvPr>
@@ -27940,7 +27940,7 @@
             <p:cNvPr id="24" name="Freeform 114">
               <a:extLst>
                 <a:ext uri="{FF2B5EF4-FFF2-40B4-BE49-F238E27FC236}">
-                  <a16:creationId xmlns="" xmlns:a16="http://schemas.microsoft.com/office/drawing/2014/main" id="{F2AE930D-887F-4A52-A067-9C77D031CF63}"/>
+                  <a16:creationId xmlns:a16="http://schemas.microsoft.com/office/drawing/2014/main" xmlns="" id="{F2AE930D-887F-4A52-A067-9C77D031CF63}"/>
                 </a:ext>
               </a:extLst>
             </p:cNvPr>
@@ -28332,7 +28332,7 @@
             <p:cNvPr id="25" name="Freeform 115">
               <a:extLst>
                 <a:ext uri="{FF2B5EF4-FFF2-40B4-BE49-F238E27FC236}">
-                  <a16:creationId xmlns="" xmlns:a16="http://schemas.microsoft.com/office/drawing/2014/main" id="{22C58FBE-8B90-4D60-9771-267B7DF94962}"/>
+                  <a16:creationId xmlns:a16="http://schemas.microsoft.com/office/drawing/2014/main" xmlns="" id="{22C58FBE-8B90-4D60-9771-267B7DF94962}"/>
                 </a:ext>
               </a:extLst>
             </p:cNvPr>
@@ -28604,7 +28604,7 @@
             <p:cNvPr id="26" name="Freeform 116">
               <a:extLst>
                 <a:ext uri="{FF2B5EF4-FFF2-40B4-BE49-F238E27FC236}">
-                  <a16:creationId xmlns="" xmlns:a16="http://schemas.microsoft.com/office/drawing/2014/main" id="{16ACB36B-9D6A-4514-979B-E4B5E882725B}"/>
+                  <a16:creationId xmlns:a16="http://schemas.microsoft.com/office/drawing/2014/main" xmlns="" id="{16ACB36B-9D6A-4514-979B-E4B5E882725B}"/>
                 </a:ext>
               </a:extLst>
             </p:cNvPr>
@@ -28756,7 +28756,7 @@
             <p:cNvPr id="27" name="Freeform 117">
               <a:extLst>
                 <a:ext uri="{FF2B5EF4-FFF2-40B4-BE49-F238E27FC236}">
-                  <a16:creationId xmlns="" xmlns:a16="http://schemas.microsoft.com/office/drawing/2014/main" id="{E56F45A1-3BA2-48D1-B694-90E2D7E5F00F}"/>
+                  <a16:creationId xmlns:a16="http://schemas.microsoft.com/office/drawing/2014/main" xmlns="" id="{E56F45A1-3BA2-48D1-B694-90E2D7E5F00F}"/>
                 </a:ext>
               </a:extLst>
             </p:cNvPr>
@@ -28888,7 +28888,7 @@
             <p:cNvPr id="28" name="Freeform 118">
               <a:extLst>
                 <a:ext uri="{FF2B5EF4-FFF2-40B4-BE49-F238E27FC236}">
-                  <a16:creationId xmlns="" xmlns:a16="http://schemas.microsoft.com/office/drawing/2014/main" id="{538E39C8-6031-47A8-88F1-CF9012F1A85A}"/>
+                  <a16:creationId xmlns:a16="http://schemas.microsoft.com/office/drawing/2014/main" xmlns="" id="{538E39C8-6031-47A8-88F1-CF9012F1A85A}"/>
                 </a:ext>
               </a:extLst>
             </p:cNvPr>
@@ -29110,7 +29110,7 @@
             <p:cNvPr id="29" name="Freeform 119">
               <a:extLst>
                 <a:ext uri="{FF2B5EF4-FFF2-40B4-BE49-F238E27FC236}">
-                  <a16:creationId xmlns="" xmlns:a16="http://schemas.microsoft.com/office/drawing/2014/main" id="{D6D88D87-1A88-4DA3-84EA-348D6C165178}"/>
+                  <a16:creationId xmlns:a16="http://schemas.microsoft.com/office/drawing/2014/main" xmlns="" id="{D6D88D87-1A88-4DA3-84EA-348D6C165178}"/>
                 </a:ext>
               </a:extLst>
             </p:cNvPr>
@@ -29332,7 +29332,7 @@
             <p:cNvPr id="30" name="Freeform 120">
               <a:extLst>
                 <a:ext uri="{FF2B5EF4-FFF2-40B4-BE49-F238E27FC236}">
-                  <a16:creationId xmlns="" xmlns:a16="http://schemas.microsoft.com/office/drawing/2014/main" id="{F0B5ACCA-D6E1-45B2-81B9-6347C94E21DF}"/>
+                  <a16:creationId xmlns:a16="http://schemas.microsoft.com/office/drawing/2014/main" xmlns="" id="{F0B5ACCA-D6E1-45B2-81B9-6347C94E21DF}"/>
                 </a:ext>
               </a:extLst>
             </p:cNvPr>
@@ -29554,7 +29554,7 @@
             <p:cNvPr id="31" name="Freeform 121">
               <a:extLst>
                 <a:ext uri="{FF2B5EF4-FFF2-40B4-BE49-F238E27FC236}">
-                  <a16:creationId xmlns="" xmlns:a16="http://schemas.microsoft.com/office/drawing/2014/main" id="{174726A2-EDA9-46A3-93A1-03BE06A124F2}"/>
+                  <a16:creationId xmlns:a16="http://schemas.microsoft.com/office/drawing/2014/main" xmlns="" id="{174726A2-EDA9-46A3-93A1-03BE06A124F2}"/>
                 </a:ext>
               </a:extLst>
             </p:cNvPr>
@@ -29816,7 +29816,7 @@
             <p:cNvPr id="32" name="Freeform 122">
               <a:extLst>
                 <a:ext uri="{FF2B5EF4-FFF2-40B4-BE49-F238E27FC236}">
-                  <a16:creationId xmlns="" xmlns:a16="http://schemas.microsoft.com/office/drawing/2014/main" id="{5A8E0F72-9753-459A-B28D-417391CFB229}"/>
+                  <a16:creationId xmlns:a16="http://schemas.microsoft.com/office/drawing/2014/main" xmlns="" id="{5A8E0F72-9753-459A-B28D-417391CFB229}"/>
                 </a:ext>
               </a:extLst>
             </p:cNvPr>
@@ -29998,7 +29998,7 @@
             <p:cNvPr id="33" name="Freeform 123">
               <a:extLst>
                 <a:ext uri="{FF2B5EF4-FFF2-40B4-BE49-F238E27FC236}">
-                  <a16:creationId xmlns="" xmlns:a16="http://schemas.microsoft.com/office/drawing/2014/main" id="{3320A7A6-6BBF-4A10-AE74-EF784C22B39A}"/>
+                  <a16:creationId xmlns:a16="http://schemas.microsoft.com/office/drawing/2014/main" xmlns="" id="{3320A7A6-6BBF-4A10-AE74-EF784C22B39A}"/>
                 </a:ext>
               </a:extLst>
             </p:cNvPr>
@@ -30160,7 +30160,7 @@
             <p:cNvPr id="34" name="Freeform 124">
               <a:extLst>
                 <a:ext uri="{FF2B5EF4-FFF2-40B4-BE49-F238E27FC236}">
-                  <a16:creationId xmlns="" xmlns:a16="http://schemas.microsoft.com/office/drawing/2014/main" id="{02807F45-F5C7-4758-8C09-1F9D9FB9ECFC}"/>
+                  <a16:creationId xmlns:a16="http://schemas.microsoft.com/office/drawing/2014/main" xmlns="" id="{02807F45-F5C7-4758-8C09-1F9D9FB9ECFC}"/>
                 </a:ext>
               </a:extLst>
             </p:cNvPr>
@@ -30402,7 +30402,7 @@
             <p:cNvPr id="35" name="Freeform 125">
               <a:extLst>
                 <a:ext uri="{FF2B5EF4-FFF2-40B4-BE49-F238E27FC236}">
-                  <a16:creationId xmlns="" xmlns:a16="http://schemas.microsoft.com/office/drawing/2014/main" id="{A6672E50-E5DE-4643-932F-C7CAC9261D23}"/>
+                  <a16:creationId xmlns:a16="http://schemas.microsoft.com/office/drawing/2014/main" xmlns="" id="{A6672E50-E5DE-4643-932F-C7CAC9261D23}"/>
                 </a:ext>
               </a:extLst>
             </p:cNvPr>
@@ -30664,7 +30664,7 @@
             <p:cNvPr id="36" name="Freeform 126">
               <a:extLst>
                 <a:ext uri="{FF2B5EF4-FFF2-40B4-BE49-F238E27FC236}">
-                  <a16:creationId xmlns="" xmlns:a16="http://schemas.microsoft.com/office/drawing/2014/main" id="{EA089E74-B78F-4ACE-8046-EB079E2FCF56}"/>
+                  <a16:creationId xmlns:a16="http://schemas.microsoft.com/office/drawing/2014/main" xmlns="" id="{EA089E74-B78F-4ACE-8046-EB079E2FCF56}"/>
                 </a:ext>
               </a:extLst>
             </p:cNvPr>
@@ -31040,7 +31040,7 @@
           <p:cNvPr id="3" name="Título 1">
             <a:extLst>
               <a:ext uri="{FF2B5EF4-FFF2-40B4-BE49-F238E27FC236}">
-                <a16:creationId xmlns="" xmlns:a16="http://schemas.microsoft.com/office/drawing/2014/main" id="{C74FDE85-A811-49B8-BCA5-144B3BF9178F}"/>
+                <a16:creationId xmlns:a16="http://schemas.microsoft.com/office/drawing/2014/main" xmlns="" id="{C74FDE85-A811-49B8-BCA5-144B3BF9178F}"/>
               </a:ext>
             </a:extLst>
           </p:cNvPr>
@@ -31097,7 +31097,7 @@
           <p:cNvPr id="12" name="Imagen 11">
             <a:extLst>
               <a:ext uri="{FF2B5EF4-FFF2-40B4-BE49-F238E27FC236}">
-                <a16:creationId xmlns="" xmlns:a16="http://schemas.microsoft.com/office/drawing/2014/main" id="{0633DF26-E03C-49B7-8009-B152436760EA}"/>
+                <a16:creationId xmlns:a16="http://schemas.microsoft.com/office/drawing/2014/main" xmlns="" id="{0633DF26-E03C-49B7-8009-B152436760EA}"/>
               </a:ext>
             </a:extLst>
           </p:cNvPr>
@@ -31299,7 +31299,7 @@
           <p:cNvPr id="3" name="Título 1">
             <a:extLst>
               <a:ext uri="{FF2B5EF4-FFF2-40B4-BE49-F238E27FC236}">
-                <a16:creationId xmlns="" xmlns:a16="http://schemas.microsoft.com/office/drawing/2014/main" id="{C74FDE85-A811-49B8-BCA5-144B3BF9178F}"/>
+                <a16:creationId xmlns:a16="http://schemas.microsoft.com/office/drawing/2014/main" xmlns="" id="{C74FDE85-A811-49B8-BCA5-144B3BF9178F}"/>
               </a:ext>
             </a:extLst>
           </p:cNvPr>
@@ -31356,7 +31356,7 @@
           <p:cNvPr id="12" name="Imagen 11">
             <a:extLst>
               <a:ext uri="{FF2B5EF4-FFF2-40B4-BE49-F238E27FC236}">
-                <a16:creationId xmlns="" xmlns:a16="http://schemas.microsoft.com/office/drawing/2014/main" id="{0633DF26-E03C-49B7-8009-B152436760EA}"/>
+                <a16:creationId xmlns:a16="http://schemas.microsoft.com/office/drawing/2014/main" xmlns="" id="{0633DF26-E03C-49B7-8009-B152436760EA}"/>
               </a:ext>
             </a:extLst>
           </p:cNvPr>
@@ -31418,7 +31418,7 @@
           <p:cNvPr id="13" name="Título 1">
             <a:extLst>
               <a:ext uri="{FF2B5EF4-FFF2-40B4-BE49-F238E27FC236}">
-                <a16:creationId xmlns="" xmlns:a16="http://schemas.microsoft.com/office/drawing/2014/main" id="{C74FDE85-A811-49B8-BCA5-144B3BF9178F}"/>
+                <a16:creationId xmlns:a16="http://schemas.microsoft.com/office/drawing/2014/main" xmlns="" id="{C74FDE85-A811-49B8-BCA5-144B3BF9178F}"/>
               </a:ext>
             </a:extLst>
           </p:cNvPr>
@@ -31475,7 +31475,7 @@
           <p:cNvPr id="14" name="Título 1">
             <a:extLst>
               <a:ext uri="{FF2B5EF4-FFF2-40B4-BE49-F238E27FC236}">
-                <a16:creationId xmlns="" xmlns:a16="http://schemas.microsoft.com/office/drawing/2014/main" id="{C74FDE85-A811-49B8-BCA5-144B3BF9178F}"/>
+                <a16:creationId xmlns:a16="http://schemas.microsoft.com/office/drawing/2014/main" xmlns="" id="{C74FDE85-A811-49B8-BCA5-144B3BF9178F}"/>
               </a:ext>
             </a:extLst>
           </p:cNvPr>
@@ -31916,7 +31916,7 @@
           <p:cNvPr id="3" name="Título 1">
             <a:extLst>
               <a:ext uri="{FF2B5EF4-FFF2-40B4-BE49-F238E27FC236}">
-                <a16:creationId xmlns="" xmlns:a16="http://schemas.microsoft.com/office/drawing/2014/main" id="{C74FDE85-A811-49B8-BCA5-144B3BF9178F}"/>
+                <a16:creationId xmlns:a16="http://schemas.microsoft.com/office/drawing/2014/main" xmlns="" id="{C74FDE85-A811-49B8-BCA5-144B3BF9178F}"/>
               </a:ext>
             </a:extLst>
           </p:cNvPr>
@@ -31973,7 +31973,7 @@
           <p:cNvPr id="12" name="Imagen 11">
             <a:extLst>
               <a:ext uri="{FF2B5EF4-FFF2-40B4-BE49-F238E27FC236}">
-                <a16:creationId xmlns="" xmlns:a16="http://schemas.microsoft.com/office/drawing/2014/main" id="{0633DF26-E03C-49B7-8009-B152436760EA}"/>
+                <a16:creationId xmlns:a16="http://schemas.microsoft.com/office/drawing/2014/main" xmlns="" id="{0633DF26-E03C-49B7-8009-B152436760EA}"/>
               </a:ext>
             </a:extLst>
           </p:cNvPr>
@@ -32035,7 +32035,7 @@
           <p:cNvPr id="6" name="Título 1">
             <a:extLst>
               <a:ext uri="{FF2B5EF4-FFF2-40B4-BE49-F238E27FC236}">
-                <a16:creationId xmlns="" xmlns:a16="http://schemas.microsoft.com/office/drawing/2014/main" id="{C74FDE85-A811-49B8-BCA5-144B3BF9178F}"/>
+                <a16:creationId xmlns:a16="http://schemas.microsoft.com/office/drawing/2014/main" xmlns="" id="{C74FDE85-A811-49B8-BCA5-144B3BF9178F}"/>
               </a:ext>
             </a:extLst>
           </p:cNvPr>
@@ -32564,7 +32564,7 @@
           <p:cNvPr id="3" name="Título 1">
             <a:extLst>
               <a:ext uri="{FF2B5EF4-FFF2-40B4-BE49-F238E27FC236}">
-                <a16:creationId xmlns="" xmlns:a16="http://schemas.microsoft.com/office/drawing/2014/main" id="{C74FDE85-A811-49B8-BCA5-144B3BF9178F}"/>
+                <a16:creationId xmlns:a16="http://schemas.microsoft.com/office/drawing/2014/main" xmlns="" id="{C74FDE85-A811-49B8-BCA5-144B3BF9178F}"/>
               </a:ext>
             </a:extLst>
           </p:cNvPr>
@@ -32621,7 +32621,7 @@
           <p:cNvPr id="12" name="Imagen 11">
             <a:extLst>
               <a:ext uri="{FF2B5EF4-FFF2-40B4-BE49-F238E27FC236}">
-                <a16:creationId xmlns="" xmlns:a16="http://schemas.microsoft.com/office/drawing/2014/main" id="{0633DF26-E03C-49B7-8009-B152436760EA}"/>
+                <a16:creationId xmlns:a16="http://schemas.microsoft.com/office/drawing/2014/main" xmlns="" id="{0633DF26-E03C-49B7-8009-B152436760EA}"/>
               </a:ext>
             </a:extLst>
           </p:cNvPr>
@@ -33196,14 +33196,14 @@
       </p:sp>
       <p:sp>
         <p:nvSpPr>
-          <p:cNvPr id="5" name="CuadroTexto 4"/>
+          <p:cNvPr id="6" name="CuadroTexto 5"/>
           <p:cNvSpPr txBox="1"/>
           <p:nvPr/>
         </p:nvSpPr>
         <p:spPr>
           <a:xfrm>
-            <a:off x="-6698" y="2086755"/>
-            <a:ext cx="12192000" cy="3108543"/>
+            <a:off x="598292" y="1729090"/>
+            <a:ext cx="9307708" cy="1569660"/>
           </a:xfrm>
           <a:prstGeom prst="rect">
             <a:avLst/>
@@ -33218,120 +33218,102 @@
           <a:p>
             <a:pPr algn="just"/>
             <a:r>
-              <a:rPr lang="es-CO" sz="1400" b="1" dirty="0"/>
-              <a:t>La forma como se viene manejando es que cada Tutor y Formador, lo hace a través de la hoja electrónica Excel, documentos en Word complementado con planillas manuales y otros ni siquiera llevan un control, es importante tener presente que los proyectos de equipo, en este momento es de Desarrollo de Software en lenguaje C# y utilizando la metodología </a:t>
+              <a:rPr lang="es-CO" sz="1600" b="1" dirty="0" smtClean="0"/>
+              <a:t>Se requiere de un Sistema de Información, qu</a:t>
             </a:r>
             <a:r>
-              <a:rPr lang="es-CO" sz="1400" b="1" dirty="0" err="1"/>
-              <a:t>Scrum</a:t>
+              <a:rPr lang="es-CO" sz="1600" b="1" dirty="0" smtClean="0"/>
+              <a:t>e permita la Administración y control de las </a:t>
             </a:r>
             <a:r>
-              <a:rPr lang="es-CO" sz="1400" b="1" dirty="0"/>
+              <a:rPr lang="es-CO" sz="1600" b="1" dirty="0" smtClean="0">
+                <a:solidFill>
+                  <a:srgbClr val="00B050"/>
+                </a:solidFill>
+              </a:rPr>
+              <a:t>notas</a:t>
+            </a:r>
+            <a:r>
+              <a:rPr lang="es-CO" sz="1600" b="1" dirty="0" smtClean="0"/>
               <a:t> y </a:t>
             </a:r>
             <a:r>
-              <a:rPr lang="es-CO" sz="1400" b="1" dirty="0" err="1"/>
-              <a:t>Kanban</a:t>
+              <a:rPr lang="es-CO" sz="1600" b="1" dirty="0" smtClean="0">
+                <a:solidFill>
+                  <a:srgbClr val="00B050"/>
+                </a:solidFill>
+              </a:rPr>
+              <a:t>asistencia</a:t>
             </a:r>
             <a:r>
-              <a:rPr lang="es-CO" sz="1400" b="1" dirty="0"/>
-              <a:t>, el equipo para desarrollar el trabajo puede ser máximo de cinco y mínimo de tres estudiantes, asignándoles el Rol o Roles a desempeñar y las respectivas tareas durante cada Sprint.  </a:t>
+              <a:rPr lang="es-CO" sz="1600" b="1" dirty="0" smtClean="0"/>
+              <a:t> en </a:t>
+            </a:r>
+            <a:r>
+              <a:rPr lang="es-CO" sz="1600" b="1" dirty="0" smtClean="0">
+                <a:solidFill>
+                  <a:srgbClr val="00B050"/>
+                </a:solidFill>
+              </a:rPr>
+              <a:t>Programación, Ingles y Coach </a:t>
+            </a:r>
+            <a:r>
+              <a:rPr lang="es-CO" sz="1600" b="1" dirty="0" smtClean="0"/>
+              <a:t>de los </a:t>
+            </a:r>
+            <a:r>
+              <a:rPr lang="es-CO" sz="1600" b="1" dirty="0" smtClean="0">
+                <a:solidFill>
+                  <a:srgbClr val="FF0000"/>
+                </a:solidFill>
+              </a:rPr>
+              <a:t>estudiantes</a:t>
+            </a:r>
+            <a:r>
+              <a:rPr lang="es-CO" sz="1600" b="1" dirty="0" smtClean="0"/>
+              <a:t> de refuerzo</a:t>
+            </a:r>
+            <a:r>
+              <a:rPr lang="es-CO" sz="1600" b="1" dirty="0" smtClean="0"/>
+              <a:t>.  </a:t>
             </a:r>
           </a:p>
           <a:p>
             <a:pPr algn="just"/>
-            <a:endParaRPr lang="es-CO" sz="1400" b="1" dirty="0" smtClean="0"/>
+            <a:endParaRPr lang="es-CO" sz="1600" b="1" dirty="0" smtClean="0"/>
           </a:p>
           <a:p>
             <a:pPr algn="just"/>
             <a:r>
-              <a:rPr lang="es-CO" sz="1400" b="1" dirty="0" smtClean="0"/>
-              <a:t>Además</a:t>
+              <a:rPr lang="es-CO" sz="1600" b="1" dirty="0" smtClean="0"/>
+              <a:t>Las notas requeridas son 4 para hallar el promedio respectivo.</a:t>
             </a:r>
-            <a:r>
-              <a:rPr lang="es-CO" sz="1400" b="1" dirty="0"/>
-              <a:t>, se maneja la información de los Tutores y Formadores de dichos proyectos, así como el tema o los temas sobre los cuales trata el proyecto (Inventarios, Préstamos, Bibliotecas, Encuestas, Facturación, Negocio Virtual, Cultura, Ecología, entre otros), se debe tener en cuenta que cada estudiante solo debe de figurar en un solo proyecto. </a:t>
-            </a:r>
+            <a:endParaRPr lang="es-CO" sz="1600" b="1" dirty="0" smtClean="0"/>
+          </a:p>
+          <a:p>
+            <a:pPr algn="just"/>
+            <a:endParaRPr lang="es-CO" sz="1600" b="1" dirty="0"/>
           </a:p>
           <a:p>
             <a:pPr algn="just"/>
             <a:r>
-              <a:rPr lang="es-CO" sz="1400" b="1" dirty="0"/>
-              <a:t> </a:t>
+              <a:rPr lang="es-CO" sz="1600" b="1" dirty="0" smtClean="0"/>
+              <a:t>Por tiempos NO se requiere manejar grupos, ni docentes</a:t>
             </a:r>
-          </a:p>
-          <a:p>
-            <a:pPr algn="just"/>
-            <a:r>
-              <a:rPr lang="es-CO" sz="1400" b="1" dirty="0"/>
-              <a:t>Se ha definido que </a:t>
-            </a:r>
-            <a:r>
-              <a:rPr lang="es-CO" sz="1400" b="1" dirty="0" smtClean="0"/>
-              <a:t>cada uno de los 4 sprint tienen una nota, </a:t>
-            </a:r>
-            <a:r>
-              <a:rPr lang="es-CO" sz="1400" b="1" dirty="0"/>
-              <a:t>por lo tanto la nota definitiva </a:t>
-            </a:r>
-            <a:r>
-              <a:rPr lang="es-CO" sz="1400" b="1" dirty="0" smtClean="0"/>
-              <a:t>es el promedio y la nota mínima de </a:t>
-            </a:r>
-            <a:r>
-              <a:rPr lang="es-CO" sz="1400" b="1" dirty="0"/>
-              <a:t>aprobación es de 3.0</a:t>
-            </a:r>
-          </a:p>
-          <a:p>
-            <a:pPr algn="just"/>
-            <a:r>
-              <a:rPr lang="es-CO" sz="1400" b="1" dirty="0"/>
-              <a:t> </a:t>
-            </a:r>
-          </a:p>
-          <a:p>
-            <a:pPr algn="just"/>
-            <a:r>
-              <a:rPr lang="es-CO" sz="1400" b="1" dirty="0"/>
-              <a:t>Debe registrarse un control de los encuentros con los Tutores y Formadores, en los cuales se le dio o dará entrega de los Sprint al proyecto. En cualquier momento se requieren informes y consultas </a:t>
-            </a:r>
-            <a:r>
-              <a:rPr lang="es-CO" sz="1400" b="1" dirty="0" smtClean="0"/>
-              <a:t>para: </a:t>
-            </a:r>
-            <a:r>
-              <a:rPr lang="es-CO" sz="1400" b="1" dirty="0"/>
-              <a:t>Tutores, Formadores, </a:t>
-            </a:r>
-            <a:r>
-              <a:rPr lang="es-CO" sz="1400" b="1" dirty="0" smtClean="0"/>
-              <a:t>Estudiantes</a:t>
-            </a:r>
-            <a:r>
-              <a:rPr lang="es-CO" sz="1400" b="1" dirty="0"/>
-              <a:t>.</a:t>
-            </a:r>
-          </a:p>
-          <a:p>
-            <a:pPr algn="just"/>
-            <a:r>
-              <a:rPr lang="es-CO" sz="1400" b="1" dirty="0"/>
-              <a:t> </a:t>
-            </a:r>
+            <a:endParaRPr lang="es-CO" sz="1600" b="1" dirty="0"/>
           </a:p>
         </p:txBody>
       </p:sp>
       <p:sp>
         <p:nvSpPr>
-          <p:cNvPr id="6" name="CuadroTexto 5"/>
+          <p:cNvPr id="10" name="CuadroTexto 9"/>
           <p:cNvSpPr txBox="1"/>
           <p:nvPr/>
         </p:nvSpPr>
         <p:spPr>
           <a:xfrm>
-            <a:off x="2782692" y="768945"/>
-            <a:ext cx="9307708" cy="1323439"/>
+            <a:off x="711200" y="3746500"/>
+            <a:ext cx="9564863" cy="1200329"/>
           </a:xfrm>
           <a:prstGeom prst="rect">
             <a:avLst/>
@@ -33339,151 +33321,46 @@
           <a:noFill/>
         </p:spPr>
         <p:txBody>
-          <a:bodyPr wrap="square" rtlCol="0">
-            <a:spAutoFit/>
-          </a:bodyPr>
-          <a:lstStyle/>
-          <a:p>
-            <a:pPr algn="just"/>
-            <a:r>
-              <a:rPr lang="es-CO" sz="1600" b="1" dirty="0"/>
-              <a:t>La Universidad de Caldas, tiene dificultad con la gestión de los proyectos de los grupos de las asignaturas de Desarrollo de Software del Ciclo 3, ya que se presenta inconsistencias en la información, existen reproceso, pérdida de información, ineficiencia a la hora de dar respuestas sobre el estado de los </a:t>
-            </a:r>
-            <a:r>
-              <a:rPr lang="es-CO" sz="1600" b="1" dirty="0" smtClean="0"/>
-              <a:t>proyectos, </a:t>
-            </a:r>
-            <a:r>
-              <a:rPr lang="es-CO" sz="1600" b="1" dirty="0" err="1" smtClean="0"/>
-              <a:t>sprints</a:t>
-            </a:r>
-            <a:r>
-              <a:rPr lang="es-CO" sz="1600" b="1" dirty="0" smtClean="0"/>
-              <a:t>, notas, </a:t>
-            </a:r>
-            <a:r>
-              <a:rPr lang="es-CO" sz="1600" b="1" dirty="0"/>
-              <a:t>pérdida de </a:t>
-            </a:r>
-            <a:r>
-              <a:rPr lang="es-CO" sz="1600" b="1" dirty="0" smtClean="0"/>
-              <a:t>tiempo </a:t>
-            </a:r>
-            <a:r>
-              <a:rPr lang="es-CO" sz="1600" b="1" dirty="0"/>
-              <a:t>ya que no siempre se tiene la información a la mano, generándose inconformidad en muchas ocasiones.</a:t>
-            </a:r>
-            <a:r>
-              <a:rPr lang="es-CO" sz="1600" b="1" dirty="0" smtClean="0"/>
-              <a:t>  </a:t>
-            </a:r>
-            <a:endParaRPr lang="es-CO" sz="1600" b="1" dirty="0"/>
-          </a:p>
-        </p:txBody>
-      </p:sp>
-      <p:sp>
-        <p:nvSpPr>
-          <p:cNvPr id="8" name="CuadroTexto 7"/>
-          <p:cNvSpPr txBox="1"/>
-          <p:nvPr/>
-        </p:nvSpPr>
-        <p:spPr>
-          <a:xfrm>
-            <a:off x="3904118" y="4988649"/>
-            <a:ext cx="8262482" cy="1815882"/>
-          </a:xfrm>
-          <a:prstGeom prst="rect">
-            <a:avLst/>
-          </a:prstGeom>
-          <a:solidFill>
-            <a:srgbClr val="00B0F0"/>
-          </a:solidFill>
-        </p:spPr>
-        <p:txBody>
-          <a:bodyPr wrap="square" rtlCol="0">
+          <a:bodyPr wrap="none" rtlCol="0">
             <a:spAutoFit/>
           </a:bodyPr>
           <a:lstStyle/>
           <a:p>
             <a:r>
-              <a:rPr lang="es-CO" sz="1600" b="1" dirty="0" smtClean="0"/>
-              <a:t> Nombre </a:t>
-            </a:r>
-            <a:r>
-              <a:rPr lang="es-CO" sz="1600" b="1" dirty="0"/>
-              <a:t>de los proyectos con sus Integrantes. </a:t>
+              <a:rPr lang="es-CO" dirty="0" smtClean="0"/>
+              <a:t>FORMAS NORMALES</a:t>
             </a:r>
           </a:p>
           <a:p>
-            <a:pPr marL="285750" lvl="0" indent="-285750">
-              <a:buFont typeface="Arial" panose="020B0604020202020204" pitchFamily="34" charset="0"/>
-              <a:buChar char="•"/>
+            <a:pPr marL="342900" indent="-342900">
+              <a:buFont typeface="+mj-lt"/>
+              <a:buAutoNum type="arabicPeriod"/>
             </a:pPr>
             <a:r>
-              <a:rPr lang="es-CO" sz="1600" b="1" dirty="0"/>
-              <a:t>Proyecto con sus respectivos Tutores y Formadores, y sus fechas de Sprint, tanto para los aprobados, como para los que se encuentran en proceso. </a:t>
+              <a:rPr lang="es-CO" dirty="0" smtClean="0"/>
+              <a:t>TOMESE EL PROBLEMA DE FORMA ATOMICA (ENTIDADES – ATRIBUTOS)</a:t>
             </a:r>
           </a:p>
           <a:p>
-            <a:pPr marL="285750" lvl="0" indent="-285750">
-              <a:buFont typeface="Arial" panose="020B0604020202020204" pitchFamily="34" charset="0"/>
-              <a:buChar char="•"/>
+            <a:pPr marL="342900" indent="-342900">
+              <a:buFont typeface="+mj-lt"/>
+              <a:buAutoNum type="arabicPeriod"/>
             </a:pPr>
             <a:r>
-              <a:rPr lang="es-CO" sz="1600" b="1" dirty="0"/>
-              <a:t>Consulta por parte de los estudiantes para visualizar su proyecto y sus respectivas notas. </a:t>
+              <a:rPr lang="es-CO" dirty="0" smtClean="0"/>
+              <a:t>ASIGNAR LOS ATRIBUTOS A LAS DEPEDENCIA QUE CORRESPONDAN</a:t>
             </a:r>
           </a:p>
           <a:p>
-            <a:pPr marL="285750" lvl="0" indent="-285750">
-              <a:buFont typeface="Arial" panose="020B0604020202020204" pitchFamily="34" charset="0"/>
-              <a:buChar char="•"/>
+            <a:pPr marL="342900" indent="-342900">
+              <a:buFont typeface="+mj-lt"/>
+              <a:buAutoNum type="arabicPeriod"/>
             </a:pPr>
             <a:r>
-              <a:rPr lang="es-CO" sz="1600" b="1" dirty="0"/>
-              <a:t>Consulta sobre las fechas de asesorías de los proyectos </a:t>
+              <a:rPr lang="es-CO" dirty="0" smtClean="0"/>
+              <a:t>TODO ATRIBUTO DEBE CORRESPONDER DE FORMA ÚNICA A SU DEPENDENCIA O DEPENDENCIAS</a:t>
             </a:r>
-          </a:p>
-          <a:p>
-            <a:pPr marL="285750" lvl="0" indent="-285750">
-              <a:buFont typeface="Arial" panose="020B0604020202020204" pitchFamily="34" charset="0"/>
-              <a:buChar char="•"/>
-            </a:pPr>
-            <a:r>
-              <a:rPr lang="es-CO" sz="1600" b="1" dirty="0"/>
-              <a:t>Consultar sobre proyectos aprobados, antes de realizar del proceso de matrículas del siguiente ciclo, entre otras. </a:t>
-            </a:r>
-          </a:p>
-        </p:txBody>
-      </p:sp>
-      <p:sp>
-        <p:nvSpPr>
-          <p:cNvPr id="9" name="Rectángulo 8"/>
-          <p:cNvSpPr/>
-          <p:nvPr/>
-        </p:nvSpPr>
-        <p:spPr>
-          <a:xfrm>
-            <a:off x="0" y="4908539"/>
-            <a:ext cx="3878718" cy="1077218"/>
-          </a:xfrm>
-          <a:prstGeom prst="rect">
-            <a:avLst/>
-          </a:prstGeom>
-        </p:spPr>
-        <p:txBody>
-          <a:bodyPr wrap="square">
-            <a:spAutoFit/>
-          </a:bodyPr>
-          <a:lstStyle/>
-          <a:p>
-            <a:endParaRPr lang="es-CO" sz="1600" b="1" dirty="0"/>
-          </a:p>
-          <a:p>
-            <a:r>
-              <a:rPr lang="es-CO" sz="1600" b="1" dirty="0"/>
-              <a:t>Entre algunas de las solicitudes que se requieren en relación a los proyectos de equipo son: </a:t>
-            </a:r>
+            <a:endParaRPr lang="es-CO" dirty="0"/>
           </a:p>
         </p:txBody>
       </p:sp>
@@ -33529,7 +33406,7 @@
           <p:cNvPr id="3" name="Título 1">
             <a:extLst>
               <a:ext uri="{FF2B5EF4-FFF2-40B4-BE49-F238E27FC236}">
-                <a16:creationId xmlns="" xmlns:a16="http://schemas.microsoft.com/office/drawing/2014/main" id="{C74FDE85-A811-49B8-BCA5-144B3BF9178F}"/>
+                <a16:creationId xmlns:a16="http://schemas.microsoft.com/office/drawing/2014/main" xmlns="" id="{C74FDE85-A811-49B8-BCA5-144B3BF9178F}"/>
               </a:ext>
             </a:extLst>
           </p:cNvPr>
@@ -33595,7 +33472,489 @@
           <p:cNvPr id="12" name="Imagen 11">
             <a:extLst>
               <a:ext uri="{FF2B5EF4-FFF2-40B4-BE49-F238E27FC236}">
-                <a16:creationId xmlns="" xmlns:a16="http://schemas.microsoft.com/office/drawing/2014/main" id="{0633DF26-E03C-49B7-8009-B152436760EA}"/>
+                <a16:creationId xmlns:a16="http://schemas.microsoft.com/office/drawing/2014/main" xmlns="" id="{0633DF26-E03C-49B7-8009-B152436760EA}"/>
+              </a:ext>
+            </a:extLst>
+          </p:cNvPr>
+          <p:cNvPicPr>
+            <a:picLocks noChangeAspect="1"/>
+          </p:cNvPicPr>
+          <p:nvPr/>
+        </p:nvPicPr>
+        <p:blipFill>
+          <a:blip r:embed="rId2">
+            <a:extLst>
+              <a:ext uri="{28A0092B-C50C-407E-A947-70E740481C1C}">
+                <a14:useLocalDpi xmlns:a14="http://schemas.microsoft.com/office/drawing/2010/main" val="0"/>
+              </a:ext>
+            </a:extLst>
+          </a:blip>
+          <a:stretch>
+            <a:fillRect/>
+          </a:stretch>
+        </p:blipFill>
+        <p:spPr>
+          <a:xfrm>
+            <a:off x="8780565" y="5089159"/>
+            <a:ext cx="1226795" cy="807431"/>
+          </a:xfrm>
+          <a:prstGeom prst="rect">
+            <a:avLst/>
+          </a:prstGeom>
+        </p:spPr>
+      </p:pic>
+      <p:sp>
+        <p:nvSpPr>
+          <p:cNvPr id="7" name="Rectangle 2"/>
+          <p:cNvSpPr>
+            <a:spLocks noChangeArrowheads="1"/>
+          </p:cNvSpPr>
+          <p:nvPr/>
+        </p:nvSpPr>
+        <p:spPr bwMode="auto">
+          <a:xfrm>
+            <a:off x="2475571" y="2776654"/>
+            <a:ext cx="12192000" cy="0"/>
+          </a:xfrm>
+          <a:prstGeom prst="rect">
+            <a:avLst/>
+          </a:prstGeom>
+          <a:noFill/>
+          <a:ln>
+            <a:noFill/>
+          </a:ln>
+          <a:effectLst/>
+          <a:extLst>
+            <a:ext uri="{909E8E84-426E-40DD-AFC4-6F175D3DCCD1}">
+              <a14:hiddenFill xmlns:a14="http://schemas.microsoft.com/office/drawing/2010/main">
+                <a:solidFill>
+                  <a:schemeClr val="accent1"/>
+                </a:solidFill>
+              </a14:hiddenFill>
+            </a:ext>
+            <a:ext uri="{91240B29-F687-4F45-9708-019B960494DF}">
+              <a14:hiddenLine xmlns:a14="http://schemas.microsoft.com/office/drawing/2010/main" w="9525">
+                <a:solidFill>
+                  <a:schemeClr val="tx1"/>
+                </a:solidFill>
+                <a:miter lim="800000"/>
+                <a:headEnd/>
+                <a:tailEnd/>
+              </a14:hiddenLine>
+            </a:ext>
+            <a:ext uri="{AF507438-7753-43E0-B8FC-AC1667EBCBE1}">
+              <a14:hiddenEffects xmlns:a14="http://schemas.microsoft.com/office/drawing/2010/main">
+                <a:effectLst>
+                  <a:outerShdw dist="35921" dir="2700000" algn="ctr" rotWithShape="0">
+                    <a:schemeClr val="bg2"/>
+                  </a:outerShdw>
+                </a:effectLst>
+              </a14:hiddenEffects>
+            </a:ext>
+          </a:extLst>
+        </p:spPr>
+        <p:txBody>
+          <a:bodyPr vert="horz" wrap="none" lIns="91440" tIns="45720" rIns="91440" bIns="45720" numCol="1" anchor="ctr" anchorCtr="0" compatLnSpc="1">
+            <a:prstTxWarp prst="textNoShape">
+              <a:avLst/>
+            </a:prstTxWarp>
+            <a:spAutoFit/>
+          </a:bodyPr>
+          <a:lstStyle/>
+          <a:p>
+            <a:endParaRPr lang="es-CO"/>
+          </a:p>
+        </p:txBody>
+      </p:sp>
+      <p:sp>
+        <p:nvSpPr>
+          <p:cNvPr id="4" name="CuadroTexto 3"/>
+          <p:cNvSpPr txBox="1"/>
+          <p:nvPr/>
+        </p:nvSpPr>
+        <p:spPr>
+          <a:xfrm>
+            <a:off x="2475571" y="2292439"/>
+            <a:ext cx="184731" cy="369332"/>
+          </a:xfrm>
+          <a:prstGeom prst="rect">
+            <a:avLst/>
+          </a:prstGeom>
+          <a:noFill/>
+        </p:spPr>
+        <p:txBody>
+          <a:bodyPr wrap="none" rtlCol="0">
+            <a:spAutoFit/>
+          </a:bodyPr>
+          <a:lstStyle/>
+          <a:p>
+            <a:endParaRPr lang="es-CO" dirty="0"/>
+          </a:p>
+        </p:txBody>
+      </p:sp>
+      <p:sp>
+        <p:nvSpPr>
+          <p:cNvPr id="6" name="CuadroTexto 5"/>
+          <p:cNvSpPr txBox="1"/>
+          <p:nvPr/>
+        </p:nvSpPr>
+        <p:spPr>
+          <a:xfrm>
+            <a:off x="8338597" y="1628006"/>
+            <a:ext cx="2735044" cy="1200329"/>
+          </a:xfrm>
+          <a:prstGeom prst="rect">
+            <a:avLst/>
+          </a:prstGeom>
+          <a:noFill/>
+        </p:spPr>
+        <p:txBody>
+          <a:bodyPr wrap="none" rtlCol="0">
+            <a:spAutoFit/>
+          </a:bodyPr>
+          <a:lstStyle/>
+          <a:p>
+            <a:r>
+              <a:rPr lang="es-CO" b="1" dirty="0" smtClean="0">
+                <a:solidFill>
+                  <a:srgbClr val="FF0000"/>
+                </a:solidFill>
+              </a:rPr>
+              <a:t>CARDINALIDAD:</a:t>
+            </a:r>
+          </a:p>
+          <a:p>
+            <a:r>
+              <a:rPr lang="es-CO" b="1" dirty="0" smtClean="0">
+                <a:solidFill>
+                  <a:srgbClr val="FF0000"/>
+                </a:solidFill>
+              </a:rPr>
+              <a:t>Uno a Muchos ( 1….*)</a:t>
+            </a:r>
+          </a:p>
+          <a:p>
+            <a:r>
+              <a:rPr lang="es-CO" b="1" dirty="0" smtClean="0">
+                <a:solidFill>
+                  <a:srgbClr val="FF0000"/>
+                </a:solidFill>
+              </a:rPr>
+              <a:t>Uno a Uno        (1 ….1)</a:t>
+            </a:r>
+          </a:p>
+          <a:p>
+            <a:r>
+              <a:rPr lang="es-CO" b="1" dirty="0" smtClean="0">
+                <a:solidFill>
+                  <a:srgbClr val="FF0000"/>
+                </a:solidFill>
+              </a:rPr>
+              <a:t>Muchos a Muchos ( * …. *)</a:t>
+            </a:r>
+            <a:endParaRPr lang="es-CO" b="1" dirty="0">
+              <a:solidFill>
+                <a:srgbClr val="FF0000"/>
+              </a:solidFill>
+            </a:endParaRPr>
+          </a:p>
+        </p:txBody>
+      </p:sp>
+      <p:sp>
+        <p:nvSpPr>
+          <p:cNvPr id="8" name="CuadroTexto 7"/>
+          <p:cNvSpPr txBox="1"/>
+          <p:nvPr/>
+        </p:nvSpPr>
+        <p:spPr>
+          <a:xfrm>
+            <a:off x="9688454" y="2724371"/>
+            <a:ext cx="2503546" cy="923330"/>
+          </a:xfrm>
+          <a:prstGeom prst="rect">
+            <a:avLst/>
+          </a:prstGeom>
+          <a:noFill/>
+        </p:spPr>
+        <p:txBody>
+          <a:bodyPr wrap="square" rtlCol="0">
+            <a:spAutoFit/>
+          </a:bodyPr>
+          <a:lstStyle/>
+          <a:p>
+            <a:r>
+              <a:rPr lang="es-CO" b="1" dirty="0" smtClean="0">
+                <a:solidFill>
+                  <a:srgbClr val="0070C0"/>
+                </a:solidFill>
+              </a:rPr>
+              <a:t>Leer en ambos sentidos y tomar de cada extremo el mayor</a:t>
+            </a:r>
+            <a:endParaRPr lang="es-CO" b="1" dirty="0">
+              <a:solidFill>
+                <a:srgbClr val="0070C0"/>
+              </a:solidFill>
+            </a:endParaRPr>
+          </a:p>
+        </p:txBody>
+      </p:sp>
+      <p:sp>
+        <p:nvSpPr>
+          <p:cNvPr id="5" name="CuadroTexto 4"/>
+          <p:cNvSpPr txBox="1"/>
+          <p:nvPr/>
+        </p:nvSpPr>
+        <p:spPr>
+          <a:xfrm>
+            <a:off x="8185921" y="3543736"/>
+            <a:ext cx="4006079" cy="3416320"/>
+          </a:xfrm>
+          <a:prstGeom prst="rect">
+            <a:avLst/>
+          </a:prstGeom>
+          <a:noFill/>
+        </p:spPr>
+        <p:txBody>
+          <a:bodyPr wrap="square" rtlCol="0">
+            <a:spAutoFit/>
+          </a:bodyPr>
+          <a:lstStyle/>
+          <a:p>
+            <a:r>
+              <a:rPr lang="es-CO" b="1" dirty="0">
+                <a:solidFill>
+                  <a:srgbClr val="002060"/>
+                </a:solidFill>
+              </a:rPr>
+              <a:t>Atributo </a:t>
+            </a:r>
+            <a:r>
+              <a:rPr lang="es-CO" b="1" dirty="0" smtClean="0">
+                <a:solidFill>
+                  <a:srgbClr val="002060"/>
+                </a:solidFill>
+              </a:rPr>
+              <a:t>Identificador:</a:t>
+            </a:r>
+            <a:r>
+              <a:rPr lang="es-CO" dirty="0" smtClean="0"/>
+              <a:t> </a:t>
+            </a:r>
+            <a:r>
+              <a:rPr lang="es-CO" dirty="0"/>
+              <a:t>Si </a:t>
+            </a:r>
+            <a:r>
+              <a:rPr lang="es-CO" dirty="0" smtClean="0"/>
+              <a:t>puede identificar de forma única un registro de la entidad</a:t>
+            </a:r>
+            <a:endParaRPr lang="es-CO" b="1" dirty="0" smtClean="0">
+              <a:solidFill>
+                <a:srgbClr val="002060"/>
+              </a:solidFill>
+            </a:endParaRPr>
+          </a:p>
+          <a:p>
+            <a:r>
+              <a:rPr lang="es-CO" b="1" dirty="0" smtClean="0">
+                <a:solidFill>
+                  <a:srgbClr val="002060"/>
+                </a:solidFill>
+              </a:rPr>
+              <a:t>Atributo </a:t>
+            </a:r>
+            <a:r>
+              <a:rPr lang="es-CO" b="1" dirty="0" err="1" smtClean="0">
+                <a:solidFill>
+                  <a:srgbClr val="002060"/>
+                </a:solidFill>
+              </a:rPr>
+              <a:t>Multivaluado</a:t>
+            </a:r>
+            <a:r>
+              <a:rPr lang="es-CO" b="1" dirty="0" smtClean="0">
+                <a:solidFill>
+                  <a:srgbClr val="002060"/>
+                </a:solidFill>
+              </a:rPr>
+              <a:t>:</a:t>
+            </a:r>
+            <a:r>
+              <a:rPr lang="es-CO" dirty="0" smtClean="0"/>
+              <a:t> Si procederá de una lista corta y finita.</a:t>
+            </a:r>
+          </a:p>
+          <a:p>
+            <a:endParaRPr lang="es-CO" dirty="0"/>
+          </a:p>
+          <a:p>
+            <a:r>
+              <a:rPr lang="es-CO" b="1" dirty="0" smtClean="0">
+                <a:solidFill>
+                  <a:srgbClr val="002060"/>
+                </a:solidFill>
+              </a:rPr>
+              <a:t>Atributo Calculado: </a:t>
+            </a:r>
+            <a:r>
+              <a:rPr lang="es-CO" dirty="0" smtClean="0"/>
+              <a:t>si su valor se puede calcular de otros atributos existentes.</a:t>
+            </a:r>
+          </a:p>
+          <a:p>
+            <a:endParaRPr lang="es-CO" dirty="0"/>
+          </a:p>
+          <a:p>
+            <a:r>
+              <a:rPr lang="es-CO" b="1" dirty="0" smtClean="0">
+                <a:solidFill>
+                  <a:srgbClr val="002060"/>
+                </a:solidFill>
+              </a:rPr>
+              <a:t>Opcional</a:t>
+            </a:r>
+            <a:r>
+              <a:rPr lang="es-CO" dirty="0" smtClean="0"/>
+              <a:t> Si el valor a ingresar  no es obligado o puede ser </a:t>
+            </a:r>
+            <a:r>
+              <a:rPr lang="es-CO" dirty="0" err="1" smtClean="0"/>
+              <a:t>Null</a:t>
+            </a:r>
+            <a:r>
+              <a:rPr lang="es-CO" dirty="0" smtClean="0"/>
+              <a:t>, </a:t>
+            </a:r>
+            <a:r>
+              <a:rPr lang="es-CO" dirty="0" err="1" smtClean="0"/>
+              <a:t>punterar</a:t>
+            </a:r>
+            <a:r>
+              <a:rPr lang="es-CO" dirty="0" smtClean="0"/>
+              <a:t> su línea</a:t>
+            </a:r>
+            <a:endParaRPr lang="es-CO" dirty="0"/>
+          </a:p>
+        </p:txBody>
+      </p:sp>
+    </p:spTree>
+    <p:extLst>
+      <p:ext uri="{BB962C8B-B14F-4D97-AF65-F5344CB8AC3E}">
+        <p14:creationId xmlns:p14="http://schemas.microsoft.com/office/powerpoint/2010/main" val="4100380123"/>
+      </p:ext>
+    </p:extLst>
+  </p:cSld>
+  <p:clrMapOvr>
+    <a:masterClrMapping/>
+  </p:clrMapOvr>
+  <p:timing>
+    <p:tnLst>
+      <p:par>
+        <p:cTn id="1" dur="indefinite" restart="never" nodeType="tmRoot"/>
+      </p:par>
+    </p:tnLst>
+  </p:timing>
+</p:sld>
+</file>
+
+<file path=ppt/slides/slide7.xml><?xml version="1.0" encoding="utf-8"?>
+<p:sld xmlns:a="http://schemas.openxmlformats.org/drawingml/2006/main" xmlns:r="http://schemas.openxmlformats.org/officeDocument/2006/relationships" xmlns:p="http://schemas.openxmlformats.org/presentationml/2006/main">
+  <p:cSld>
+    <p:spTree>
+      <p:nvGrpSpPr>
+        <p:cNvPr id="1" name=""/>
+        <p:cNvGrpSpPr/>
+        <p:nvPr/>
+      </p:nvGrpSpPr>
+      <p:grpSpPr>
+        <a:xfrm>
+          <a:off x="0" y="0"/>
+          <a:ext cx="0" cy="0"/>
+          <a:chOff x="0" y="0"/>
+          <a:chExt cx="0" cy="0"/>
+        </a:xfrm>
+      </p:grpSpPr>
+      <p:sp>
+        <p:nvSpPr>
+          <p:cNvPr id="3" name="Título 1">
+            <a:extLst>
+              <a:ext uri="{FF2B5EF4-FFF2-40B4-BE49-F238E27FC236}">
+                <a16:creationId xmlns:a16="http://schemas.microsoft.com/office/drawing/2014/main" xmlns="" id="{C74FDE85-A811-49B8-BCA5-144B3BF9178F}"/>
+              </a:ext>
+            </a:extLst>
+          </p:cNvPr>
+          <p:cNvSpPr txBox="1">
+            <a:spLocks/>
+          </p:cNvSpPr>
+          <p:nvPr/>
+        </p:nvSpPr>
+        <p:spPr>
+          <a:xfrm>
+            <a:off x="3453715" y="0"/>
+            <a:ext cx="5768343" cy="674703"/>
+          </a:xfrm>
+          <a:prstGeom prst="rect">
+            <a:avLst/>
+          </a:prstGeom>
+        </p:spPr>
+        <p:txBody>
+          <a:bodyPr vert="horz" lIns="91440" tIns="45720" rIns="91440" bIns="45720" rtlCol="0" anchor="ctr">
+            <a:normAutofit fontScale="52500" lnSpcReduction="20000"/>
+          </a:bodyPr>
+          <a:lstStyle>
+            <a:lvl1pPr algn="l" defTabSz="914400" rtl="0" eaLnBrk="1" latinLnBrk="0" hangingPunct="1">
+              <a:lnSpc>
+                <a:spcPct val="90000"/>
+              </a:lnSpc>
+              <a:spcBef>
+                <a:spcPct val="0"/>
+              </a:spcBef>
+              <a:buNone/>
+              <a:defRPr sz="4400" kern="1200">
+                <a:solidFill>
+                  <a:schemeClr val="tx1"/>
+                </a:solidFill>
+                <a:latin typeface="+mj-lt"/>
+                <a:ea typeface="+mj-ea"/>
+                <a:cs typeface="+mj-cs"/>
+              </a:defRPr>
+            </a:lvl1pPr>
+          </a:lstStyle>
+          <a:p>
+            <a:pPr algn="ctr"/>
+            <a:r>
+              <a:rPr lang="es-CO" b="1" dirty="0" smtClean="0">
+                <a:solidFill>
+                  <a:schemeClr val="bg1"/>
+                </a:solidFill>
+                <a:latin typeface="Calabri"/>
+              </a:rPr>
+              <a:t>Representación del Modelo Conceptual del problema </a:t>
+            </a:r>
+            <a:r>
+              <a:rPr lang="es-CO" b="1" dirty="0" smtClean="0">
+                <a:solidFill>
+                  <a:schemeClr val="bg1"/>
+                </a:solidFill>
+                <a:latin typeface="Calabri"/>
+              </a:rPr>
+              <a:t>planteado - avanzado</a:t>
+            </a:r>
+            <a:endParaRPr lang="es-CO" b="1" dirty="0">
+              <a:solidFill>
+                <a:schemeClr val="bg1"/>
+              </a:solidFill>
+              <a:latin typeface="Calabri"/>
+            </a:endParaRPr>
+          </a:p>
+        </p:txBody>
+      </p:sp>
+      <p:pic>
+        <p:nvPicPr>
+          <p:cNvPr id="12" name="Imagen 11">
+            <a:extLst>
+              <a:ext uri="{FF2B5EF4-FFF2-40B4-BE49-F238E27FC236}">
+                <a16:creationId xmlns:a16="http://schemas.microsoft.com/office/drawing/2014/main" xmlns="" id="{0633DF26-E03C-49B7-8009-B152436760EA}"/>
               </a:ext>
             </a:extLst>
           </p:cNvPr>
@@ -34042,8 +34401,8 @@
         </p:blipFill>
         <p:spPr>
           <a:xfrm>
-            <a:off x="419101" y="-39242"/>
-            <a:ext cx="11264900" cy="6857507"/>
+            <a:off x="92365" y="919760"/>
+            <a:ext cx="9702801" cy="5906579"/>
           </a:xfrm>
           <a:prstGeom prst="rect">
             <a:avLst/>
@@ -34053,7 +34412,7 @@
     </p:spTree>
     <p:extLst>
       <p:ext uri="{BB962C8B-B14F-4D97-AF65-F5344CB8AC3E}">
-        <p14:creationId xmlns:p14="http://schemas.microsoft.com/office/powerpoint/2010/main" val="4100380123"/>
+        <p14:creationId xmlns:p14="http://schemas.microsoft.com/office/powerpoint/2010/main" val="2743450932"/>
       </p:ext>
     </p:extLst>
   </p:cSld>
@@ -34070,7 +34429,7 @@
 </p:sld>
 </file>
 
-<file path=ppt/slides/slide7.xml><?xml version="1.0" encoding="utf-8"?>
+<file path=ppt/slides/slide8.xml><?xml version="1.0" encoding="utf-8"?>
 <p:sld xmlns:a="http://schemas.openxmlformats.org/drawingml/2006/main" xmlns:r="http://schemas.openxmlformats.org/officeDocument/2006/relationships" xmlns:p="http://schemas.openxmlformats.org/presentationml/2006/main">
   <p:cSld>
     <p:spTree>
@@ -34092,7 +34451,7 @@
           <p:cNvPr id="3" name="Título 1">
             <a:extLst>
               <a:ext uri="{FF2B5EF4-FFF2-40B4-BE49-F238E27FC236}">
-                <a16:creationId xmlns="" xmlns:a16="http://schemas.microsoft.com/office/drawing/2014/main" id="{C74FDE85-A811-49B8-BCA5-144B3BF9178F}"/>
+                <a16:creationId xmlns:a16="http://schemas.microsoft.com/office/drawing/2014/main" xmlns="" id="{C74FDE85-A811-49B8-BCA5-144B3BF9178F}"/>
               </a:ext>
             </a:extLst>
           </p:cNvPr>
@@ -34149,280 +34508,7 @@
           <p:cNvPr id="12" name="Imagen 11">
             <a:extLst>
               <a:ext uri="{FF2B5EF4-FFF2-40B4-BE49-F238E27FC236}">
-                <a16:creationId xmlns="" xmlns:a16="http://schemas.microsoft.com/office/drawing/2014/main" id="{0633DF26-E03C-49B7-8009-B152436760EA}"/>
-              </a:ext>
-            </a:extLst>
-          </p:cNvPr>
-          <p:cNvPicPr>
-            <a:picLocks noChangeAspect="1"/>
-          </p:cNvPicPr>
-          <p:nvPr/>
-        </p:nvPicPr>
-        <p:blipFill>
-          <a:blip r:embed="rId2">
-            <a:extLst>
-              <a:ext uri="{28A0092B-C50C-407E-A947-70E740481C1C}">
-                <a14:useLocalDpi xmlns:a14="http://schemas.microsoft.com/office/drawing/2010/main" val="0"/>
-              </a:ext>
-            </a:extLst>
-          </a:blip>
-          <a:stretch>
-            <a:fillRect/>
-          </a:stretch>
-        </p:blipFill>
-        <p:spPr>
-          <a:xfrm>
-            <a:off x="8780565" y="5089159"/>
-            <a:ext cx="1226795" cy="807431"/>
-          </a:xfrm>
-          <a:prstGeom prst="rect">
-            <a:avLst/>
-          </a:prstGeom>
-        </p:spPr>
-      </p:pic>
-      <p:sp>
-        <p:nvSpPr>
-          <p:cNvPr id="7" name="Rectangle 2"/>
-          <p:cNvSpPr>
-            <a:spLocks noChangeArrowheads="1"/>
-          </p:cNvSpPr>
-          <p:nvPr/>
-        </p:nvSpPr>
-        <p:spPr bwMode="auto">
-          <a:xfrm>
-            <a:off x="2475571" y="2776654"/>
-            <a:ext cx="12192000" cy="0"/>
-          </a:xfrm>
-          <a:prstGeom prst="rect">
-            <a:avLst/>
-          </a:prstGeom>
-          <a:noFill/>
-          <a:ln>
-            <a:noFill/>
-          </a:ln>
-          <a:effectLst/>
-          <a:extLst>
-            <a:ext uri="{909E8E84-426E-40DD-AFC4-6F175D3DCCD1}">
-              <a14:hiddenFill xmlns:a14="http://schemas.microsoft.com/office/drawing/2010/main">
-                <a:solidFill>
-                  <a:schemeClr val="accent1"/>
-                </a:solidFill>
-              </a14:hiddenFill>
-            </a:ext>
-            <a:ext uri="{91240B29-F687-4F45-9708-019B960494DF}">
-              <a14:hiddenLine xmlns:a14="http://schemas.microsoft.com/office/drawing/2010/main" w="9525">
-                <a:solidFill>
-                  <a:schemeClr val="tx1"/>
-                </a:solidFill>
-                <a:miter lim="800000"/>
-                <a:headEnd/>
-                <a:tailEnd/>
-              </a14:hiddenLine>
-            </a:ext>
-            <a:ext uri="{AF507438-7753-43E0-B8FC-AC1667EBCBE1}">
-              <a14:hiddenEffects xmlns:a14="http://schemas.microsoft.com/office/drawing/2010/main">
-                <a:effectLst>
-                  <a:outerShdw dist="35921" dir="2700000" algn="ctr" rotWithShape="0">
-                    <a:schemeClr val="bg2"/>
-                  </a:outerShdw>
-                </a:effectLst>
-              </a14:hiddenEffects>
-            </a:ext>
-          </a:extLst>
-        </p:spPr>
-        <p:txBody>
-          <a:bodyPr vert="horz" wrap="none" lIns="91440" tIns="45720" rIns="91440" bIns="45720" numCol="1" anchor="ctr" anchorCtr="0" compatLnSpc="1">
-            <a:prstTxWarp prst="textNoShape">
-              <a:avLst/>
-            </a:prstTxWarp>
-            <a:spAutoFit/>
-          </a:bodyPr>
-          <a:lstStyle/>
-          <a:p>
-            <a:endParaRPr lang="es-CO"/>
-          </a:p>
-        </p:txBody>
-      </p:sp>
-      <p:sp>
-        <p:nvSpPr>
-          <p:cNvPr id="4" name="CuadroTexto 3"/>
-          <p:cNvSpPr txBox="1"/>
-          <p:nvPr/>
-        </p:nvSpPr>
-        <p:spPr>
-          <a:xfrm>
-            <a:off x="2475571" y="2292439"/>
-            <a:ext cx="184731" cy="369332"/>
-          </a:xfrm>
-          <a:prstGeom prst="rect">
-            <a:avLst/>
-          </a:prstGeom>
-          <a:noFill/>
-        </p:spPr>
-        <p:txBody>
-          <a:bodyPr wrap="none" rtlCol="0">
-            <a:spAutoFit/>
-          </a:bodyPr>
-          <a:lstStyle/>
-          <a:p>
-            <a:endParaRPr lang="es-CO" dirty="0"/>
-          </a:p>
-        </p:txBody>
-      </p:sp>
-      <p:sp>
-        <p:nvSpPr>
-          <p:cNvPr id="8" name="CuadroTexto 7"/>
-          <p:cNvSpPr txBox="1"/>
-          <p:nvPr/>
-        </p:nvSpPr>
-        <p:spPr>
-          <a:xfrm>
-            <a:off x="4561726" y="79067"/>
-            <a:ext cx="3552319" cy="523220"/>
-          </a:xfrm>
-          <a:prstGeom prst="rect">
-            <a:avLst/>
-          </a:prstGeom>
-          <a:noFill/>
-        </p:spPr>
-        <p:txBody>
-          <a:bodyPr wrap="none" rtlCol="0">
-            <a:spAutoFit/>
-          </a:bodyPr>
-          <a:lstStyle/>
-          <a:p>
-            <a:r>
-              <a:rPr lang="es-CO" sz="2800" dirty="0" smtClean="0"/>
-              <a:t>TALLER DE APLICACIÓN</a:t>
-            </a:r>
-            <a:endParaRPr lang="es-CO" sz="2800" dirty="0"/>
-          </a:p>
-        </p:txBody>
-      </p:sp>
-      <p:pic>
-        <p:nvPicPr>
-          <p:cNvPr id="10" name="Imagen 9"/>
-          <p:cNvPicPr>
-            <a:picLocks noChangeAspect="1"/>
-          </p:cNvPicPr>
-          <p:nvPr/>
-        </p:nvPicPr>
-        <p:blipFill>
-          <a:blip r:embed="rId3"/>
-          <a:stretch>
-            <a:fillRect/>
-          </a:stretch>
-        </p:blipFill>
-        <p:spPr>
-          <a:xfrm>
-            <a:off x="3680281" y="753770"/>
-            <a:ext cx="7729545" cy="6010636"/>
-          </a:xfrm>
-          <a:prstGeom prst="rect">
-            <a:avLst/>
-          </a:prstGeom>
-        </p:spPr>
-      </p:pic>
-    </p:spTree>
-    <p:extLst>
-      <p:ext uri="{BB962C8B-B14F-4D97-AF65-F5344CB8AC3E}">
-        <p14:creationId xmlns:p14="http://schemas.microsoft.com/office/powerpoint/2010/main" val="3344089495"/>
-      </p:ext>
-    </p:extLst>
-  </p:cSld>
-  <p:clrMapOvr>
-    <a:masterClrMapping/>
-  </p:clrMapOvr>
-  <p:timing>
-    <p:tnLst>
-      <p:par>
-        <p:cTn id="1" dur="indefinite" restart="never" nodeType="tmRoot"/>
-      </p:par>
-    </p:tnLst>
-  </p:timing>
-</p:sld>
-</file>
-
-<file path=ppt/slides/slide8.xml><?xml version="1.0" encoding="utf-8"?>
-<p:sld xmlns:a="http://schemas.openxmlformats.org/drawingml/2006/main" xmlns:r="http://schemas.openxmlformats.org/officeDocument/2006/relationships" xmlns:p="http://schemas.openxmlformats.org/presentationml/2006/main">
-  <p:cSld>
-    <p:spTree>
-      <p:nvGrpSpPr>
-        <p:cNvPr id="1" name=""/>
-        <p:cNvGrpSpPr/>
-        <p:nvPr/>
-      </p:nvGrpSpPr>
-      <p:grpSpPr>
-        <a:xfrm>
-          <a:off x="0" y="0"/>
-          <a:ext cx="0" cy="0"/>
-          <a:chOff x="0" y="0"/>
-          <a:chExt cx="0" cy="0"/>
-        </a:xfrm>
-      </p:grpSpPr>
-      <p:sp>
-        <p:nvSpPr>
-          <p:cNvPr id="3" name="Título 1">
-            <a:extLst>
-              <a:ext uri="{FF2B5EF4-FFF2-40B4-BE49-F238E27FC236}">
-                <a16:creationId xmlns="" xmlns:a16="http://schemas.microsoft.com/office/drawing/2014/main" id="{C74FDE85-A811-49B8-BCA5-144B3BF9178F}"/>
-              </a:ext>
-            </a:extLst>
-          </p:cNvPr>
-          <p:cNvSpPr txBox="1">
-            <a:spLocks/>
-          </p:cNvSpPr>
-          <p:nvPr/>
-        </p:nvSpPr>
-        <p:spPr>
-          <a:xfrm>
-            <a:off x="3453715" y="0"/>
-            <a:ext cx="5768343" cy="674703"/>
-          </a:xfrm>
-          <a:prstGeom prst="rect">
-            <a:avLst/>
-          </a:prstGeom>
-        </p:spPr>
-        <p:txBody>
-          <a:bodyPr vert="horz" lIns="91440" tIns="45720" rIns="91440" bIns="45720" rtlCol="0" anchor="ctr">
-            <a:normAutofit fontScale="97500" lnSpcReduction="10000"/>
-          </a:bodyPr>
-          <a:lstStyle>
-            <a:lvl1pPr algn="l" defTabSz="914400" rtl="0" eaLnBrk="1" latinLnBrk="0" hangingPunct="1">
-              <a:lnSpc>
-                <a:spcPct val="90000"/>
-              </a:lnSpc>
-              <a:spcBef>
-                <a:spcPct val="0"/>
-              </a:spcBef>
-              <a:buNone/>
-              <a:defRPr sz="4400" kern="1200">
-                <a:solidFill>
-                  <a:schemeClr val="tx1"/>
-                </a:solidFill>
-                <a:latin typeface="+mj-lt"/>
-                <a:ea typeface="+mj-ea"/>
-                <a:cs typeface="+mj-cs"/>
-              </a:defRPr>
-            </a:lvl1pPr>
-          </a:lstStyle>
-          <a:p>
-            <a:pPr algn="ctr"/>
-            <a:endParaRPr lang="es-CO" b="1" dirty="0">
-              <a:solidFill>
-                <a:schemeClr val="bg1"/>
-              </a:solidFill>
-              <a:latin typeface="Calabri"/>
-            </a:endParaRPr>
-          </a:p>
-        </p:txBody>
-      </p:sp>
-      <p:pic>
-        <p:nvPicPr>
-          <p:cNvPr id="12" name="Imagen 11">
-            <a:extLst>
-              <a:ext uri="{FF2B5EF4-FFF2-40B4-BE49-F238E27FC236}">
-                <a16:creationId xmlns="" xmlns:a16="http://schemas.microsoft.com/office/drawing/2014/main" id="{0633DF26-E03C-49B7-8009-B152436760EA}"/>
+                <a16:creationId xmlns:a16="http://schemas.microsoft.com/office/drawing/2014/main" xmlns="" id="{0633DF26-E03C-49B7-8009-B152436760EA}"/>
               </a:ext>
             </a:extLst>
           </p:cNvPr>

</xml_diff>